<commit_message>
H3, ISK, Solo Daily
H3 updates adding support for Nugget, ISK updated to run full zone, update solo daily quest zone
</commit_message>
<xml_diff>
--- a/EQ2OgreBot/InstanceController/Instance_Files/Custom/_Exp_20_Ballads_of_Zimara/Helper_Files/Aether_Wroughtlands_Native_Mettle.pptx
+++ b/EQ2OgreBot/InstanceController/Instance_Files/Custom/_Exp_20_Ballads_of_Zimara/Helper_Files/Aether_Wroughtlands_Native_Mettle.pptx
@@ -6,6 +6,7 @@
   </p:sldMasterIdLst>
   <p:sldIdLst>
     <p:sldId id="256" r:id="rId2"/>
+    <p:sldId id="257" r:id="rId3"/>
   </p:sldIdLst>
   <p:sldSz cx="12192000" cy="6858000"/>
   <p:notesSz cx="6858000" cy="9144000"/>
@@ -112,6 +113,34 @@
 </p:presentation>
 </file>
 
+<file path=ppt/ink/ink1.xml><?xml version="1.0" encoding="utf-8"?>
+<inkml:ink xmlns:inkml="http://www.w3.org/2003/InkML">
+  <inkml:definitions>
+    <inkml:context xml:id="ctx0">
+      <inkml:inkSource xml:id="inkSrc0">
+        <inkml:traceFormat>
+          <inkml:channel name="X" type="integer" min="-2.14748E9" max="2.14748E9" units="cm"/>
+          <inkml:channel name="Y" type="integer" min="-2.14748E9" max="2.14748E9" units="cm"/>
+          <inkml:channel name="F" type="integer" max="32767" units="dev"/>
+        </inkml:traceFormat>
+        <inkml:channelProperties>
+          <inkml:channelProperty channel="X" name="resolution" value="1000" units="1/cm"/>
+          <inkml:channelProperty channel="Y" name="resolution" value="1000" units="1/cm"/>
+          <inkml:channelProperty channel="F" name="resolution" value="0" units="1/dev"/>
+        </inkml:channelProperties>
+      </inkml:inkSource>
+      <inkml:timestamp xml:id="ts0" timeString="2024-03-06T20:22:53.391"/>
+    </inkml:context>
+    <inkml:brush xml:id="br0">
+      <inkml:brushProperty name="width" value="0.21167" units="cm"/>
+      <inkml:brushProperty name="height" value="0.21167" units="cm"/>
+      <inkml:brushProperty name="color" value="#E71224"/>
+    </inkml:brush>
+  </inkml:definitions>
+  <inkml:trace contextRef="#ctx0" brushRef="#br0">7773 0 24575,'0'1332'0,"-1"-1313"0,-1 1 0,-7 29 0,5-29 0,1 0 0,-1 28 0,2-14 0,-11 61 0,11-85 0,-17 126 0,-3-3 0,2-53 0,-13 75 0,28-130 0,0-1 0,-2-1 0,-1 1 0,0-1 0,-2 0 0,-18 31 0,14-28 0,-17 47 0,22-49 0,-1 0 0,-26 43 0,2 1 0,28-53 0,-1-1 0,0 0 0,-13 19 0,13-22 0,1 0 0,0 0 0,0 1 0,1 0 0,-5 21 0,6-20 0,0-1 0,0-1 0,-1 1 0,0-1 0,-1 0 0,-8 12 0,2-5 0,2 0 0,0 0 0,1 1 0,1 0 0,-10 34 0,10-28 0,-1 0 0,-22 42 0,-41 83 0,61-129 0,1 0 0,1 0 0,1 1 0,-9 40 0,10-36 0,0-1 0,-2 0 0,-15 31 0,10-25 0,1 0 0,1 1 0,-9 43 0,13-49 0,-59 152 0,51-102 0,11-50 0,-1 0 0,0-1 0,-15 34 0,15-42 0,0 2 0,1-1 0,1 1 0,-3 31 0,4-25 0,-12 46 0,2-25 0,8-26 0,-1 0 0,-1-1 0,0 1 0,-12 19 0,-14 32 0,-6 8 0,25-54 0,-18 45 0,22-47 0,0 0 0,-24 38 0,6-8 0,24-44 0,0 0 0,-1 0 0,0 0 0,0 0 0,-11 13 0,8-12 0,1 0 0,0 1 0,0 0 0,-5 14 0,-14 22 0,-19 13 0,31-44 0,1 1 0,0 1 0,-12 24 0,19-31 0,-1 0 0,-1 0 0,-10 12 0,-16 23 0,-15 32 0,-75 93 0,1-6 0,101-137 0,-1-1 0,-39 35 0,40-40 0,-55 55 0,33-29 0,14-15 0,-140 161 0,90-109 0,-9 6 0,-1-5 0,54-54 0,-89 101 0,115-123 0,-23 24 0,-1-2 0,-45 34 0,72-60 0,0 0 0,1 0 0,0 1 0,-10 13 0,10-12 0,0 0 0,-1-1 0,1 0 0,-9 7 0,-100 91 0,57-58 0,-56 52 0,-19 12 0,32-31 0,100-79 0,-14 16 0,-2 0 0,0-1 0,-1-1 0,0-1 0,-41 24 0,53-35 0,0 1 0,0 1 0,0-1 0,1 1 0,-1 0 0,-7 9 0,8-8 0,0 0 0,-1 0 0,0-1 0,0 0 0,-13 8 0,-49 33 0,52-34 0,-1 0 0,-24 12 0,33-19 0,1 0 0,-1 0 0,1 1 0,0 0 0,1 0 0,-7 8 0,7-8 0,0 0 0,-1 0 0,1 0 0,-1 0 0,0-1 0,-11 6 0,-7 2 0,0 2 0,1 1 0,-27 24 0,24-19 0,-48 30 0,63-44 0,-42 24 0,-93 38 0,136-64 0,0 1 0,1 0 0,0 1 0,-17 13 0,-16 11 0,4-7 0,8-4 0,-38 17 0,-49 28 0,81-43 0,-53 25 0,34-15 0,45-25 0,1 0 0,-1-1 0,-1 0 0,-12 5 0,-29 9 0,-51 28 0,-4 2 0,43-17 0,49-24 0,0-1 0,-1 0 0,1-1 0,-20 5 0,16-5 0,0 0 0,-30 16 0,-32 12 0,68-32 0,1 1 0,0 1 0,1 0 0,-1 1 0,1 0 0,-19 13 0,22-13 0,-1-1 0,1 0 0,-1 0 0,0-1 0,0 0 0,-21 4 0,22-5 0,-1-1 0,1 1 0,0 0 0,0 1 0,0 0 0,1 0 0,0 1 0,-1 0 0,-6 6 0,6-4 0,1-1 0,-1-1 0,-1 0 0,1 0 0,-1-1 0,0 0 0,1-1 0,-2 0 0,-18 3 0,18-4 0,0 1 0,0 0 0,0 0 0,0 1 0,1 1 0,-1-1 0,1 2 0,-11 6 0,13-7 0,0 0 0,0-1 0,-1 0 0,0 0 0,0-1 0,0 0 0,0-1 0,0 0 0,-14 1 0,-46 14 0,4 8 0,-2-4 0,-90 18 0,130-33 0,0 1 0,1 1 0,0 1 0,0 2 0,-38 20 0,45-22 0,0-1 0,0-1 0,-1-1 0,0-1 0,-23 4 0,-7 1 0,45-9 0,-8 2 0,-1 1 0,1 0 0,-1 1 0,1 0 0,-13 8 0,4-3 0,-1-1 0,0 0 0,-43 8 0,31-8 0,-14 2 0,32-8 0,0 1 0,0 1 0,-23 9 0,6 0 0,-1-3 0,0 0 0,-1-2 0,-73 7 0,94-12-170,1 1-1,0 0 0,0 0 1,0 2-1,1 0 0,0 0 1,-24 18-1,26-17-6655</inkml:trace>
+</inkml:ink>
+</file>
+
 <file path=ppt/slideLayouts/slideLayout1.xml><?xml version="1.0" encoding="utf-8"?>
 <p:sldLayout xmlns:a="http://schemas.openxmlformats.org/drawingml/2006/main" xmlns:r="http://schemas.openxmlformats.org/officeDocument/2006/relationships" xmlns:p="http://schemas.openxmlformats.org/presentationml/2006/main" type="title" preserve="1">
   <p:cSld name="Title Slide">
@@ -259,7 +288,7 @@
           <a:p>
             <a:fld id="{A104A8F8-B6D5-4E8F-8180-ACC6E594B62F}" type="datetimeFigureOut">
               <a:rPr lang="en-US" smtClean="0"/>
-              <a:t>2/29/2024</a:t>
+              <a:t>3/15/2024</a:t>
             </a:fld>
             <a:endParaRPr lang="en-US"/>
           </a:p>
@@ -457,7 +486,7 @@
           <a:p>
             <a:fld id="{A104A8F8-B6D5-4E8F-8180-ACC6E594B62F}" type="datetimeFigureOut">
               <a:rPr lang="en-US" smtClean="0"/>
-              <a:t>2/29/2024</a:t>
+              <a:t>3/15/2024</a:t>
             </a:fld>
             <a:endParaRPr lang="en-US"/>
           </a:p>
@@ -665,7 +694,7 @@
           <a:p>
             <a:fld id="{A104A8F8-B6D5-4E8F-8180-ACC6E594B62F}" type="datetimeFigureOut">
               <a:rPr lang="en-US" smtClean="0"/>
-              <a:t>2/29/2024</a:t>
+              <a:t>3/15/2024</a:t>
             </a:fld>
             <a:endParaRPr lang="en-US"/>
           </a:p>
@@ -863,7 +892,7 @@
           <a:p>
             <a:fld id="{A104A8F8-B6D5-4E8F-8180-ACC6E594B62F}" type="datetimeFigureOut">
               <a:rPr lang="en-US" smtClean="0"/>
-              <a:t>2/29/2024</a:t>
+              <a:t>3/15/2024</a:t>
             </a:fld>
             <a:endParaRPr lang="en-US"/>
           </a:p>
@@ -1138,7 +1167,7 @@
           <a:p>
             <a:fld id="{A104A8F8-B6D5-4E8F-8180-ACC6E594B62F}" type="datetimeFigureOut">
               <a:rPr lang="en-US" smtClean="0"/>
-              <a:t>2/29/2024</a:t>
+              <a:t>3/15/2024</a:t>
             </a:fld>
             <a:endParaRPr lang="en-US"/>
           </a:p>
@@ -1403,7 +1432,7 @@
           <a:p>
             <a:fld id="{A104A8F8-B6D5-4E8F-8180-ACC6E594B62F}" type="datetimeFigureOut">
               <a:rPr lang="en-US" smtClean="0"/>
-              <a:t>2/29/2024</a:t>
+              <a:t>3/15/2024</a:t>
             </a:fld>
             <a:endParaRPr lang="en-US"/>
           </a:p>
@@ -1815,7 +1844,7 @@
           <a:p>
             <a:fld id="{A104A8F8-B6D5-4E8F-8180-ACC6E594B62F}" type="datetimeFigureOut">
               <a:rPr lang="en-US" smtClean="0"/>
-              <a:t>2/29/2024</a:t>
+              <a:t>3/15/2024</a:t>
             </a:fld>
             <a:endParaRPr lang="en-US"/>
           </a:p>
@@ -1956,7 +1985,7 @@
           <a:p>
             <a:fld id="{A104A8F8-B6D5-4E8F-8180-ACC6E594B62F}" type="datetimeFigureOut">
               <a:rPr lang="en-US" smtClean="0"/>
-              <a:t>2/29/2024</a:t>
+              <a:t>3/15/2024</a:t>
             </a:fld>
             <a:endParaRPr lang="en-US"/>
           </a:p>
@@ -2069,7 +2098,7 @@
           <a:p>
             <a:fld id="{A104A8F8-B6D5-4E8F-8180-ACC6E594B62F}" type="datetimeFigureOut">
               <a:rPr lang="en-US" smtClean="0"/>
-              <a:t>2/29/2024</a:t>
+              <a:t>3/15/2024</a:t>
             </a:fld>
             <a:endParaRPr lang="en-US"/>
           </a:p>
@@ -2380,7 +2409,7 @@
           <a:p>
             <a:fld id="{A104A8F8-B6D5-4E8F-8180-ACC6E594B62F}" type="datetimeFigureOut">
               <a:rPr lang="en-US" smtClean="0"/>
-              <a:t>2/29/2024</a:t>
+              <a:t>3/15/2024</a:t>
             </a:fld>
             <a:endParaRPr lang="en-US"/>
           </a:p>
@@ -2668,7 +2697,7 @@
           <a:p>
             <a:fld id="{A104A8F8-B6D5-4E8F-8180-ACC6E594B62F}" type="datetimeFigureOut">
               <a:rPr lang="en-US" smtClean="0"/>
-              <a:t>2/29/2024</a:t>
+              <a:t>3/15/2024</a:t>
             </a:fld>
             <a:endParaRPr lang="en-US"/>
           </a:p>
@@ -2909,7 +2938,7 @@
           <a:p>
             <a:fld id="{A104A8F8-B6D5-4E8F-8180-ACC6E594B62F}" type="datetimeFigureOut">
               <a:rPr lang="en-US" smtClean="0"/>
-              <a:t>2/29/2024</a:t>
+              <a:t>3/15/2024</a:t>
             </a:fld>
             <a:endParaRPr lang="en-US"/>
           </a:p>
@@ -3386,7 +3415,7 @@
           <a:p>
             <a:pPr algn="ctr"/>
             <a:r>
-              <a:rPr lang="en-US" sz="2800" dirty="0">
+              <a:rPr lang="en-US" sz="2800" strike="sngStrike" dirty="0">
                 <a:ln w="0"/>
                 <a:effectLst>
                   <a:outerShdw blurRad="38100" dist="19050" dir="2700000" algn="tl" rotWithShape="0">
@@ -3398,7 +3427,7 @@
               </a:rPr>
               <a:t>1</a:t>
             </a:r>
-            <a:endParaRPr lang="en-US" sz="2800" b="0" cap="none" spc="0" dirty="0">
+            <a:endParaRPr lang="en-US" sz="2800" b="0" strike="sngStrike" cap="none" spc="0" dirty="0">
               <a:ln w="0"/>
               <a:solidFill>
                 <a:schemeClr val="tx1"/>
@@ -3800,6 +3829,2095 @@
           <a:p>
             <a:pPr algn="ctr"/>
             <a:r>
+              <a:rPr lang="en-US" sz="2800" b="0" strike="sngStrike" cap="none" spc="0" dirty="0">
+                <a:ln w="0"/>
+                <a:solidFill>
+                  <a:schemeClr val="tx1"/>
+                </a:solidFill>
+                <a:effectLst>
+                  <a:outerShdw blurRad="38100" dist="19050" dir="2700000" algn="tl" rotWithShape="0">
+                    <a:schemeClr val="dk1">
+                      <a:alpha val="40000"/>
+                    </a:schemeClr>
+                  </a:outerShdw>
+                </a:effectLst>
+              </a:rPr>
+              <a:t>8</a:t>
+            </a:r>
+          </a:p>
+        </p:txBody>
+      </p:sp>
+      <p:sp>
+        <p:nvSpPr>
+          <p:cNvPr id="15" name="Rectangle 14">
+            <a:extLst>
+              <a:ext uri="{FF2B5EF4-FFF2-40B4-BE49-F238E27FC236}">
+                <a16:creationId xmlns:a16="http://schemas.microsoft.com/office/drawing/2014/main" id="{6A2C7282-F1DB-1B6A-DAC6-192ED7C0C132}"/>
+              </a:ext>
+            </a:extLst>
+          </p:cNvPr>
+          <p:cNvSpPr/>
+          <p:nvPr/>
+        </p:nvSpPr>
+        <p:spPr>
+          <a:xfrm>
+            <a:off x="5249389" y="1830010"/>
+            <a:ext cx="367408" cy="523220"/>
+          </a:xfrm>
+          <a:prstGeom prst="rect">
+            <a:avLst/>
+          </a:prstGeom>
+          <a:noFill/>
+        </p:spPr>
+        <p:txBody>
+          <a:bodyPr wrap="none" lIns="91440" tIns="45720" rIns="91440" bIns="45720">
+            <a:spAutoFit/>
+          </a:bodyPr>
+          <a:lstStyle/>
+          <a:p>
+            <a:pPr algn="ctr"/>
+            <a:r>
+              <a:rPr lang="en-US" sz="2800" b="0" strike="sngStrike" cap="none" spc="0" dirty="0">
+                <a:ln w="0"/>
+                <a:solidFill>
+                  <a:schemeClr val="tx1"/>
+                </a:solidFill>
+                <a:effectLst>
+                  <a:outerShdw blurRad="38100" dist="19050" dir="2700000" algn="tl" rotWithShape="0">
+                    <a:schemeClr val="dk1">
+                      <a:alpha val="40000"/>
+                    </a:schemeClr>
+                  </a:outerShdw>
+                </a:effectLst>
+              </a:rPr>
+              <a:t>9</a:t>
+            </a:r>
+          </a:p>
+        </p:txBody>
+      </p:sp>
+      <p:sp>
+        <p:nvSpPr>
+          <p:cNvPr id="16" name="Rectangle 15">
+            <a:extLst>
+              <a:ext uri="{FF2B5EF4-FFF2-40B4-BE49-F238E27FC236}">
+                <a16:creationId xmlns:a16="http://schemas.microsoft.com/office/drawing/2014/main" id="{3AE88115-682D-7A4B-C123-26805C6429F9}"/>
+              </a:ext>
+            </a:extLst>
+          </p:cNvPr>
+          <p:cNvSpPr/>
+          <p:nvPr/>
+        </p:nvSpPr>
+        <p:spPr>
+          <a:xfrm>
+            <a:off x="5721795" y="1830010"/>
+            <a:ext cx="550151" cy="523220"/>
+          </a:xfrm>
+          <a:prstGeom prst="rect">
+            <a:avLst/>
+          </a:prstGeom>
+          <a:noFill/>
+        </p:spPr>
+        <p:txBody>
+          <a:bodyPr wrap="none" lIns="91440" tIns="45720" rIns="91440" bIns="45720">
+            <a:spAutoFit/>
+          </a:bodyPr>
+          <a:lstStyle/>
+          <a:p>
+            <a:pPr algn="ctr"/>
+            <a:r>
+              <a:rPr lang="en-US" sz="2800" strike="sngStrike" dirty="0">
+                <a:ln w="0"/>
+                <a:effectLst>
+                  <a:outerShdw blurRad="38100" dist="19050" dir="2700000" algn="tl" rotWithShape="0">
+                    <a:schemeClr val="dk1">
+                      <a:alpha val="40000"/>
+                    </a:schemeClr>
+                  </a:outerShdw>
+                </a:effectLst>
+              </a:rPr>
+              <a:t>10</a:t>
+            </a:r>
+            <a:endParaRPr lang="en-US" sz="2800" b="0" strike="sngStrike" cap="none" spc="0" dirty="0">
+              <a:ln w="0"/>
+              <a:solidFill>
+                <a:schemeClr val="tx1"/>
+              </a:solidFill>
+              <a:effectLst>
+                <a:outerShdw blurRad="38100" dist="19050" dir="2700000" algn="tl" rotWithShape="0">
+                  <a:schemeClr val="dk1">
+                    <a:alpha val="40000"/>
+                  </a:schemeClr>
+                </a:outerShdw>
+              </a:effectLst>
+            </a:endParaRPr>
+          </a:p>
+        </p:txBody>
+      </p:sp>
+    </p:spTree>
+    <p:extLst>
+      <p:ext uri="{BB962C8B-B14F-4D97-AF65-F5344CB8AC3E}">
+        <p14:creationId xmlns:p14="http://schemas.microsoft.com/office/powerpoint/2010/main" val="3214210540"/>
+      </p:ext>
+    </p:extLst>
+  </p:cSld>
+  <p:clrMapOvr>
+    <a:masterClrMapping/>
+  </p:clrMapOvr>
+</p:sld>
+</file>
+
+<file path=ppt/slides/slide2.xml><?xml version="1.0" encoding="utf-8"?>
+<p:sld xmlns:a="http://schemas.openxmlformats.org/drawingml/2006/main" xmlns:r="http://schemas.openxmlformats.org/officeDocument/2006/relationships" xmlns:p="http://schemas.openxmlformats.org/presentationml/2006/main">
+  <p:cSld>
+    <p:spTree>
+      <p:nvGrpSpPr>
+        <p:cNvPr id="1" name=""/>
+        <p:cNvGrpSpPr/>
+        <p:nvPr/>
+      </p:nvGrpSpPr>
+      <p:grpSpPr>
+        <a:xfrm>
+          <a:off x="0" y="0"/>
+          <a:ext cx="0" cy="0"/>
+          <a:chOff x="0" y="0"/>
+          <a:chExt cx="0" cy="0"/>
+        </a:xfrm>
+      </p:grpSpPr>
+      <p:pic>
+        <p:nvPicPr>
+          <p:cNvPr id="5" name="Picture 4">
+            <a:extLst>
+              <a:ext uri="{FF2B5EF4-FFF2-40B4-BE49-F238E27FC236}">
+                <a16:creationId xmlns:a16="http://schemas.microsoft.com/office/drawing/2014/main" id="{D963E9F9-EB63-8A7D-15ED-4D4FE7B6D93D}"/>
+              </a:ext>
+            </a:extLst>
+          </p:cNvPr>
+          <p:cNvPicPr>
+            <a:picLocks noChangeAspect="1"/>
+          </p:cNvPicPr>
+          <p:nvPr/>
+        </p:nvPicPr>
+        <p:blipFill>
+          <a:blip r:embed="rId2"/>
+          <a:stretch>
+            <a:fillRect/>
+          </a:stretch>
+        </p:blipFill>
+        <p:spPr>
+          <a:xfrm>
+            <a:off x="1411311" y="0"/>
+            <a:ext cx="9365546" cy="6855194"/>
+          </a:xfrm>
+          <a:prstGeom prst="rect">
+            <a:avLst/>
+          </a:prstGeom>
+        </p:spPr>
+      </p:pic>
+      <mc:AlternateContent xmlns:mc="http://schemas.openxmlformats.org/markup-compatibility/2006" xmlns:p14="http://schemas.microsoft.com/office/powerpoint/2010/main">
+        <mc:Choice Requires="p14">
+          <p:contentPart p14:bwMode="auto" r:id="rId3">
+            <p14:nvContentPartPr>
+              <p14:cNvPr id="6" name="Ink 5">
+                <a:extLst>
+                  <a:ext uri="{FF2B5EF4-FFF2-40B4-BE49-F238E27FC236}">
+                    <a16:creationId xmlns:a16="http://schemas.microsoft.com/office/drawing/2014/main" id="{30DA1E78-6F57-54E7-FB97-5A3737652E58}"/>
+                  </a:ext>
+                </a:extLst>
+              </p14:cNvPr>
+              <p14:cNvContentPartPr/>
+              <p14:nvPr/>
+            </p14:nvContentPartPr>
+            <p14:xfrm>
+              <a:off x="4696763" y="2375897"/>
+              <a:ext cx="2798473" cy="3388088"/>
+            </p14:xfrm>
+          </p:contentPart>
+        </mc:Choice>
+        <mc:Fallback xmlns="">
+          <p:pic>
+            <p:nvPicPr>
+              <p:cNvPr id="6" name="Ink 5">
+                <a:extLst>
+                  <a:ext uri="{FF2B5EF4-FFF2-40B4-BE49-F238E27FC236}">
+                    <a16:creationId xmlns:a16="http://schemas.microsoft.com/office/drawing/2014/main" id="{30DA1E78-6F57-54E7-FB97-5A3737652E58}"/>
+                  </a:ext>
+                </a:extLst>
+              </p:cNvPr>
+              <p:cNvPicPr/>
+              <p:nvPr/>
+            </p:nvPicPr>
+            <p:blipFill>
+              <a:blip r:embed="rId4"/>
+              <a:stretch>
+                <a:fillRect/>
+              </a:stretch>
+            </p:blipFill>
+            <p:spPr>
+              <a:xfrm>
+                <a:off x="4658605" y="2337736"/>
+                <a:ext cx="2874068" cy="3464051"/>
+              </a:xfrm>
+              <a:prstGeom prst="rect">
+                <a:avLst/>
+              </a:prstGeom>
+            </p:spPr>
+          </p:pic>
+        </mc:Fallback>
+      </mc:AlternateContent>
+      <p:sp>
+        <p:nvSpPr>
+          <p:cNvPr id="7" name="Oval 6">
+            <a:extLst>
+              <a:ext uri="{FF2B5EF4-FFF2-40B4-BE49-F238E27FC236}">
+                <a16:creationId xmlns:a16="http://schemas.microsoft.com/office/drawing/2014/main" id="{DB7AC3C7-0A97-0EBE-EFA4-35B1408CCCB6}"/>
+              </a:ext>
+            </a:extLst>
+          </p:cNvPr>
+          <p:cNvSpPr/>
+          <p:nvPr/>
+        </p:nvSpPr>
+        <p:spPr>
+          <a:xfrm>
+            <a:off x="6817179" y="2294254"/>
+            <a:ext cx="163286" cy="163286"/>
+          </a:xfrm>
+          <a:prstGeom prst="ellipse">
+            <a:avLst/>
+          </a:prstGeom>
+          <a:solidFill>
+            <a:srgbClr val="FFC000"/>
+          </a:solidFill>
+        </p:spPr>
+        <p:style>
+          <a:lnRef idx="2">
+            <a:schemeClr val="accent1">
+              <a:shade val="15000"/>
+            </a:schemeClr>
+          </a:lnRef>
+          <a:fillRef idx="1">
+            <a:schemeClr val="accent1"/>
+          </a:fillRef>
+          <a:effectRef idx="0">
+            <a:schemeClr val="accent1"/>
+          </a:effectRef>
+          <a:fontRef idx="minor">
+            <a:schemeClr val="lt1"/>
+          </a:fontRef>
+        </p:style>
+        <p:txBody>
+          <a:bodyPr rtlCol="0" anchor="ctr"/>
+          <a:lstStyle/>
+          <a:p>
+            <a:pPr algn="ctr"/>
+            <a:r>
+              <a:rPr lang="en-US" dirty="0">
+                <a:solidFill>
+                  <a:schemeClr val="tx1"/>
+                </a:solidFill>
+              </a:rPr>
+              <a:t>2</a:t>
+            </a:r>
+          </a:p>
+        </p:txBody>
+      </p:sp>
+      <p:sp>
+        <p:nvSpPr>
+          <p:cNvPr id="8" name="Oval 7">
+            <a:extLst>
+              <a:ext uri="{FF2B5EF4-FFF2-40B4-BE49-F238E27FC236}">
+                <a16:creationId xmlns:a16="http://schemas.microsoft.com/office/drawing/2014/main" id="{F50CBCCF-2D6F-8ABE-3086-04FDBFF667C7}"/>
+              </a:ext>
+            </a:extLst>
+          </p:cNvPr>
+          <p:cNvSpPr/>
+          <p:nvPr/>
+        </p:nvSpPr>
+        <p:spPr>
+          <a:xfrm>
+            <a:off x="6817179" y="2457540"/>
+            <a:ext cx="163286" cy="163286"/>
+          </a:xfrm>
+          <a:prstGeom prst="ellipse">
+            <a:avLst/>
+          </a:prstGeom>
+          <a:solidFill>
+            <a:srgbClr val="FFC000"/>
+          </a:solidFill>
+        </p:spPr>
+        <p:style>
+          <a:lnRef idx="2">
+            <a:schemeClr val="accent1">
+              <a:shade val="15000"/>
+            </a:schemeClr>
+          </a:lnRef>
+          <a:fillRef idx="1">
+            <a:schemeClr val="accent1"/>
+          </a:fillRef>
+          <a:effectRef idx="0">
+            <a:schemeClr val="accent1"/>
+          </a:effectRef>
+          <a:fontRef idx="minor">
+            <a:schemeClr val="lt1"/>
+          </a:fontRef>
+        </p:style>
+        <p:txBody>
+          <a:bodyPr rtlCol="0" anchor="ctr"/>
+          <a:lstStyle/>
+          <a:p>
+            <a:pPr algn="ctr"/>
+            <a:r>
+              <a:rPr lang="en-US" dirty="0">
+                <a:solidFill>
+                  <a:schemeClr val="tx1"/>
+                </a:solidFill>
+              </a:rPr>
+              <a:t>2</a:t>
+            </a:r>
+          </a:p>
+        </p:txBody>
+      </p:sp>
+      <p:sp>
+        <p:nvSpPr>
+          <p:cNvPr id="9" name="Oval 8">
+            <a:extLst>
+              <a:ext uri="{FF2B5EF4-FFF2-40B4-BE49-F238E27FC236}">
+                <a16:creationId xmlns:a16="http://schemas.microsoft.com/office/drawing/2014/main" id="{B8EBF3D8-C068-D239-A8BC-0F052D85C8D4}"/>
+              </a:ext>
+            </a:extLst>
+          </p:cNvPr>
+          <p:cNvSpPr/>
+          <p:nvPr/>
+        </p:nvSpPr>
+        <p:spPr>
+          <a:xfrm>
+            <a:off x="6438901" y="3452180"/>
+            <a:ext cx="163286" cy="163286"/>
+          </a:xfrm>
+          <a:prstGeom prst="ellipse">
+            <a:avLst/>
+          </a:prstGeom>
+          <a:solidFill>
+            <a:srgbClr val="FFC000"/>
+          </a:solidFill>
+        </p:spPr>
+        <p:style>
+          <a:lnRef idx="2">
+            <a:schemeClr val="accent1">
+              <a:shade val="15000"/>
+            </a:schemeClr>
+          </a:lnRef>
+          <a:fillRef idx="1">
+            <a:schemeClr val="accent1"/>
+          </a:fillRef>
+          <a:effectRef idx="0">
+            <a:schemeClr val="accent1"/>
+          </a:effectRef>
+          <a:fontRef idx="minor">
+            <a:schemeClr val="lt1"/>
+          </a:fontRef>
+        </p:style>
+        <p:txBody>
+          <a:bodyPr rtlCol="0" anchor="ctr"/>
+          <a:lstStyle/>
+          <a:p>
+            <a:pPr algn="ctr"/>
+            <a:r>
+              <a:rPr lang="en-US" dirty="0">
+                <a:solidFill>
+                  <a:schemeClr val="tx1"/>
+                </a:solidFill>
+              </a:rPr>
+              <a:t>3</a:t>
+            </a:r>
+          </a:p>
+        </p:txBody>
+      </p:sp>
+      <p:sp>
+        <p:nvSpPr>
+          <p:cNvPr id="10" name="Oval 9">
+            <a:extLst>
+              <a:ext uri="{FF2B5EF4-FFF2-40B4-BE49-F238E27FC236}">
+                <a16:creationId xmlns:a16="http://schemas.microsoft.com/office/drawing/2014/main" id="{A929C962-C58F-1749-5583-C4DBDA36BF99}"/>
+              </a:ext>
+            </a:extLst>
+          </p:cNvPr>
+          <p:cNvSpPr/>
+          <p:nvPr/>
+        </p:nvSpPr>
+        <p:spPr>
+          <a:xfrm>
+            <a:off x="5597979" y="4479561"/>
+            <a:ext cx="163286" cy="163286"/>
+          </a:xfrm>
+          <a:prstGeom prst="ellipse">
+            <a:avLst/>
+          </a:prstGeom>
+          <a:solidFill>
+            <a:srgbClr val="FFC000"/>
+          </a:solidFill>
+        </p:spPr>
+        <p:style>
+          <a:lnRef idx="2">
+            <a:schemeClr val="accent1">
+              <a:shade val="15000"/>
+            </a:schemeClr>
+          </a:lnRef>
+          <a:fillRef idx="1">
+            <a:schemeClr val="accent1"/>
+          </a:fillRef>
+          <a:effectRef idx="0">
+            <a:schemeClr val="accent1"/>
+          </a:effectRef>
+          <a:fontRef idx="minor">
+            <a:schemeClr val="lt1"/>
+          </a:fontRef>
+        </p:style>
+        <p:txBody>
+          <a:bodyPr rtlCol="0" anchor="ctr"/>
+          <a:lstStyle/>
+          <a:p>
+            <a:pPr algn="ctr"/>
+            <a:r>
+              <a:rPr lang="en-US" dirty="0">
+                <a:solidFill>
+                  <a:schemeClr val="tx1"/>
+                </a:solidFill>
+              </a:rPr>
+              <a:t>7</a:t>
+            </a:r>
+          </a:p>
+        </p:txBody>
+      </p:sp>
+      <p:sp>
+        <p:nvSpPr>
+          <p:cNvPr id="11" name="Oval 10">
+            <a:extLst>
+              <a:ext uri="{FF2B5EF4-FFF2-40B4-BE49-F238E27FC236}">
+                <a16:creationId xmlns:a16="http://schemas.microsoft.com/office/drawing/2014/main" id="{3999C085-19F6-7086-54F6-DA3EE07202B8}"/>
+              </a:ext>
+            </a:extLst>
+          </p:cNvPr>
+          <p:cNvSpPr/>
+          <p:nvPr/>
+        </p:nvSpPr>
+        <p:spPr>
+          <a:xfrm>
+            <a:off x="4822371" y="5026568"/>
+            <a:ext cx="163286" cy="163286"/>
+          </a:xfrm>
+          <a:prstGeom prst="ellipse">
+            <a:avLst/>
+          </a:prstGeom>
+          <a:solidFill>
+            <a:srgbClr val="FFC000"/>
+          </a:solidFill>
+        </p:spPr>
+        <p:style>
+          <a:lnRef idx="2">
+            <a:schemeClr val="accent1">
+              <a:shade val="15000"/>
+            </a:schemeClr>
+          </a:lnRef>
+          <a:fillRef idx="1">
+            <a:schemeClr val="accent1"/>
+          </a:fillRef>
+          <a:effectRef idx="0">
+            <a:schemeClr val="accent1"/>
+          </a:effectRef>
+          <a:fontRef idx="minor">
+            <a:schemeClr val="lt1"/>
+          </a:fontRef>
+        </p:style>
+        <p:txBody>
+          <a:bodyPr rtlCol="0" anchor="ctr"/>
+          <a:lstStyle/>
+          <a:p>
+            <a:pPr algn="ctr"/>
+            <a:r>
+              <a:rPr lang="en-US" dirty="0">
+                <a:solidFill>
+                  <a:schemeClr val="tx1"/>
+                </a:solidFill>
+              </a:rPr>
+              <a:t>9</a:t>
+            </a:r>
+          </a:p>
+        </p:txBody>
+      </p:sp>
+      <p:sp>
+        <p:nvSpPr>
+          <p:cNvPr id="12" name="Oval 11">
+            <a:extLst>
+              <a:ext uri="{FF2B5EF4-FFF2-40B4-BE49-F238E27FC236}">
+                <a16:creationId xmlns:a16="http://schemas.microsoft.com/office/drawing/2014/main" id="{8A672C23-256B-9AED-768A-BCB26B1E1E42}"/>
+              </a:ext>
+            </a:extLst>
+          </p:cNvPr>
+          <p:cNvSpPr/>
+          <p:nvPr/>
+        </p:nvSpPr>
+        <p:spPr>
+          <a:xfrm>
+            <a:off x="4904014" y="5189854"/>
+            <a:ext cx="163286" cy="163286"/>
+          </a:xfrm>
+          <a:prstGeom prst="ellipse">
+            <a:avLst/>
+          </a:prstGeom>
+          <a:solidFill>
+            <a:srgbClr val="FFC000"/>
+          </a:solidFill>
+        </p:spPr>
+        <p:style>
+          <a:lnRef idx="2">
+            <a:schemeClr val="accent1">
+              <a:shade val="15000"/>
+            </a:schemeClr>
+          </a:lnRef>
+          <a:fillRef idx="1">
+            <a:schemeClr val="accent1"/>
+          </a:fillRef>
+          <a:effectRef idx="0">
+            <a:schemeClr val="accent1"/>
+          </a:effectRef>
+          <a:fontRef idx="minor">
+            <a:schemeClr val="lt1"/>
+          </a:fontRef>
+        </p:style>
+        <p:txBody>
+          <a:bodyPr rtlCol="0" anchor="ctr"/>
+          <a:lstStyle/>
+          <a:p>
+            <a:pPr algn="ctr"/>
+            <a:r>
+              <a:rPr lang="en-US" dirty="0">
+                <a:solidFill>
+                  <a:schemeClr val="tx1"/>
+                </a:solidFill>
+              </a:rPr>
+              <a:t>9</a:t>
+            </a:r>
+          </a:p>
+        </p:txBody>
+      </p:sp>
+      <p:sp>
+        <p:nvSpPr>
+          <p:cNvPr id="13" name="Oval 12">
+            <a:extLst>
+              <a:ext uri="{FF2B5EF4-FFF2-40B4-BE49-F238E27FC236}">
+                <a16:creationId xmlns:a16="http://schemas.microsoft.com/office/drawing/2014/main" id="{A975F678-37EC-3047-0195-7A5BE5AB40F7}"/>
+              </a:ext>
+            </a:extLst>
+          </p:cNvPr>
+          <p:cNvSpPr/>
+          <p:nvPr/>
+        </p:nvSpPr>
+        <p:spPr>
+          <a:xfrm>
+            <a:off x="4985657" y="5353140"/>
+            <a:ext cx="163286" cy="163286"/>
+          </a:xfrm>
+          <a:prstGeom prst="ellipse">
+            <a:avLst/>
+          </a:prstGeom>
+          <a:solidFill>
+            <a:srgbClr val="FFC000"/>
+          </a:solidFill>
+        </p:spPr>
+        <p:style>
+          <a:lnRef idx="2">
+            <a:schemeClr val="accent1">
+              <a:shade val="15000"/>
+            </a:schemeClr>
+          </a:lnRef>
+          <a:fillRef idx="1">
+            <a:schemeClr val="accent1"/>
+          </a:fillRef>
+          <a:effectRef idx="0">
+            <a:schemeClr val="accent1"/>
+          </a:effectRef>
+          <a:fontRef idx="minor">
+            <a:schemeClr val="lt1"/>
+          </a:fontRef>
+        </p:style>
+        <p:txBody>
+          <a:bodyPr rtlCol="0" anchor="ctr"/>
+          <a:lstStyle/>
+          <a:p>
+            <a:pPr algn="ctr"/>
+            <a:r>
+              <a:rPr lang="en-US" dirty="0">
+                <a:solidFill>
+                  <a:schemeClr val="tx1"/>
+                </a:solidFill>
+              </a:rPr>
+              <a:t>8</a:t>
+            </a:r>
+          </a:p>
+        </p:txBody>
+      </p:sp>
+      <p:sp>
+        <p:nvSpPr>
+          <p:cNvPr id="14" name="Oval 13">
+            <a:extLst>
+              <a:ext uri="{FF2B5EF4-FFF2-40B4-BE49-F238E27FC236}">
+                <a16:creationId xmlns:a16="http://schemas.microsoft.com/office/drawing/2014/main" id="{8F831826-35B3-576D-BD65-C5D2D1054147}"/>
+              </a:ext>
+            </a:extLst>
+          </p:cNvPr>
+          <p:cNvSpPr/>
+          <p:nvPr/>
+        </p:nvSpPr>
+        <p:spPr>
+          <a:xfrm>
+            <a:off x="5108544" y="5023938"/>
+            <a:ext cx="163286" cy="163286"/>
+          </a:xfrm>
+          <a:prstGeom prst="ellipse">
+            <a:avLst/>
+          </a:prstGeom>
+          <a:solidFill>
+            <a:srgbClr val="FFC000"/>
+          </a:solidFill>
+        </p:spPr>
+        <p:style>
+          <a:lnRef idx="2">
+            <a:schemeClr val="accent1">
+              <a:shade val="15000"/>
+            </a:schemeClr>
+          </a:lnRef>
+          <a:fillRef idx="1">
+            <a:schemeClr val="accent1"/>
+          </a:fillRef>
+          <a:effectRef idx="0">
+            <a:schemeClr val="accent1"/>
+          </a:effectRef>
+          <a:fontRef idx="minor">
+            <a:schemeClr val="lt1"/>
+          </a:fontRef>
+        </p:style>
+        <p:txBody>
+          <a:bodyPr rtlCol="0" anchor="ctr"/>
+          <a:lstStyle/>
+          <a:p>
+            <a:pPr algn="ctr"/>
+            <a:r>
+              <a:rPr lang="en-US" dirty="0">
+                <a:solidFill>
+                  <a:schemeClr val="tx1"/>
+                </a:solidFill>
+              </a:rPr>
+              <a:t>9</a:t>
+            </a:r>
+          </a:p>
+        </p:txBody>
+      </p:sp>
+      <p:sp>
+        <p:nvSpPr>
+          <p:cNvPr id="15" name="Oval 14">
+            <a:extLst>
+              <a:ext uri="{FF2B5EF4-FFF2-40B4-BE49-F238E27FC236}">
+                <a16:creationId xmlns:a16="http://schemas.microsoft.com/office/drawing/2014/main" id="{3E94749A-2EC1-D060-3E95-E9520D34CA2A}"/>
+              </a:ext>
+            </a:extLst>
+          </p:cNvPr>
+          <p:cNvSpPr/>
+          <p:nvPr/>
+        </p:nvSpPr>
+        <p:spPr>
+          <a:xfrm>
+            <a:off x="8186057" y="1042397"/>
+            <a:ext cx="163286" cy="163286"/>
+          </a:xfrm>
+          <a:prstGeom prst="ellipse">
+            <a:avLst/>
+          </a:prstGeom>
+          <a:solidFill>
+            <a:srgbClr val="FFC000"/>
+          </a:solidFill>
+        </p:spPr>
+        <p:style>
+          <a:lnRef idx="2">
+            <a:schemeClr val="accent1">
+              <a:shade val="15000"/>
+            </a:schemeClr>
+          </a:lnRef>
+          <a:fillRef idx="1">
+            <a:schemeClr val="accent1"/>
+          </a:fillRef>
+          <a:effectRef idx="0">
+            <a:schemeClr val="accent1"/>
+          </a:effectRef>
+          <a:fontRef idx="minor">
+            <a:schemeClr val="lt1"/>
+          </a:fontRef>
+        </p:style>
+        <p:txBody>
+          <a:bodyPr rtlCol="0" anchor="ctr"/>
+          <a:lstStyle/>
+          <a:p>
+            <a:pPr algn="ctr"/>
+            <a:endParaRPr lang="en-US">
+              <a:solidFill>
+                <a:schemeClr val="tx1"/>
+              </a:solidFill>
+            </a:endParaRPr>
+          </a:p>
+        </p:txBody>
+      </p:sp>
+      <p:sp>
+        <p:nvSpPr>
+          <p:cNvPr id="16" name="Oval 15">
+            <a:extLst>
+              <a:ext uri="{FF2B5EF4-FFF2-40B4-BE49-F238E27FC236}">
+                <a16:creationId xmlns:a16="http://schemas.microsoft.com/office/drawing/2014/main" id="{C49015C8-3264-C2A0-A9D4-0F44126CA0E6}"/>
+              </a:ext>
+            </a:extLst>
+          </p:cNvPr>
+          <p:cNvSpPr/>
+          <p:nvPr/>
+        </p:nvSpPr>
+        <p:spPr>
+          <a:xfrm>
+            <a:off x="8022771" y="960754"/>
+            <a:ext cx="163286" cy="163286"/>
+          </a:xfrm>
+          <a:prstGeom prst="ellipse">
+            <a:avLst/>
+          </a:prstGeom>
+          <a:solidFill>
+            <a:srgbClr val="FFC000"/>
+          </a:solidFill>
+        </p:spPr>
+        <p:style>
+          <a:lnRef idx="2">
+            <a:schemeClr val="accent1">
+              <a:shade val="15000"/>
+            </a:schemeClr>
+          </a:lnRef>
+          <a:fillRef idx="1">
+            <a:schemeClr val="accent1"/>
+          </a:fillRef>
+          <a:effectRef idx="0">
+            <a:schemeClr val="accent1"/>
+          </a:effectRef>
+          <a:fontRef idx="minor">
+            <a:schemeClr val="lt1"/>
+          </a:fontRef>
+        </p:style>
+        <p:txBody>
+          <a:bodyPr rtlCol="0" anchor="ctr"/>
+          <a:lstStyle/>
+          <a:p>
+            <a:pPr algn="ctr"/>
+            <a:endParaRPr lang="en-US">
+              <a:solidFill>
+                <a:schemeClr val="tx1"/>
+              </a:solidFill>
+            </a:endParaRPr>
+          </a:p>
+        </p:txBody>
+      </p:sp>
+      <p:sp>
+        <p:nvSpPr>
+          <p:cNvPr id="18" name="Oval 17">
+            <a:extLst>
+              <a:ext uri="{FF2B5EF4-FFF2-40B4-BE49-F238E27FC236}">
+                <a16:creationId xmlns:a16="http://schemas.microsoft.com/office/drawing/2014/main" id="{D2044734-6654-1FE7-89C0-A4E04CCBE215}"/>
+              </a:ext>
+            </a:extLst>
+          </p:cNvPr>
+          <p:cNvSpPr/>
+          <p:nvPr/>
+        </p:nvSpPr>
+        <p:spPr>
+          <a:xfrm>
+            <a:off x="8349343" y="2457540"/>
+            <a:ext cx="163286" cy="163286"/>
+          </a:xfrm>
+          <a:prstGeom prst="ellipse">
+            <a:avLst/>
+          </a:prstGeom>
+          <a:solidFill>
+            <a:srgbClr val="FFC000"/>
+          </a:solidFill>
+        </p:spPr>
+        <p:style>
+          <a:lnRef idx="2">
+            <a:schemeClr val="accent1">
+              <a:shade val="15000"/>
+            </a:schemeClr>
+          </a:lnRef>
+          <a:fillRef idx="1">
+            <a:schemeClr val="accent1"/>
+          </a:fillRef>
+          <a:effectRef idx="0">
+            <a:schemeClr val="accent1"/>
+          </a:effectRef>
+          <a:fontRef idx="minor">
+            <a:schemeClr val="lt1"/>
+          </a:fontRef>
+        </p:style>
+        <p:txBody>
+          <a:bodyPr rtlCol="0" anchor="ctr"/>
+          <a:lstStyle/>
+          <a:p>
+            <a:pPr algn="ctr"/>
+            <a:endParaRPr lang="en-US">
+              <a:solidFill>
+                <a:schemeClr val="tx1"/>
+              </a:solidFill>
+            </a:endParaRPr>
+          </a:p>
+        </p:txBody>
+      </p:sp>
+      <p:sp>
+        <p:nvSpPr>
+          <p:cNvPr id="19" name="Oval 18">
+            <a:extLst>
+              <a:ext uri="{FF2B5EF4-FFF2-40B4-BE49-F238E27FC236}">
+                <a16:creationId xmlns:a16="http://schemas.microsoft.com/office/drawing/2014/main" id="{F4FACA4A-29E5-3C7D-EA5F-2A627B419142}"/>
+              </a:ext>
+            </a:extLst>
+          </p:cNvPr>
+          <p:cNvSpPr/>
+          <p:nvPr/>
+        </p:nvSpPr>
+        <p:spPr>
+          <a:xfrm>
+            <a:off x="7965622" y="3386956"/>
+            <a:ext cx="163286" cy="163286"/>
+          </a:xfrm>
+          <a:prstGeom prst="ellipse">
+            <a:avLst/>
+          </a:prstGeom>
+          <a:solidFill>
+            <a:srgbClr val="FFC000"/>
+          </a:solidFill>
+        </p:spPr>
+        <p:style>
+          <a:lnRef idx="2">
+            <a:schemeClr val="accent1">
+              <a:shade val="15000"/>
+            </a:schemeClr>
+          </a:lnRef>
+          <a:fillRef idx="1">
+            <a:schemeClr val="accent1"/>
+          </a:fillRef>
+          <a:effectRef idx="0">
+            <a:schemeClr val="accent1"/>
+          </a:effectRef>
+          <a:fontRef idx="minor">
+            <a:schemeClr val="lt1"/>
+          </a:fontRef>
+        </p:style>
+        <p:txBody>
+          <a:bodyPr rtlCol="0" anchor="ctr"/>
+          <a:lstStyle/>
+          <a:p>
+            <a:pPr algn="ctr"/>
+            <a:endParaRPr lang="en-US">
+              <a:solidFill>
+                <a:schemeClr val="tx1"/>
+              </a:solidFill>
+            </a:endParaRPr>
+          </a:p>
+        </p:txBody>
+      </p:sp>
+      <p:sp>
+        <p:nvSpPr>
+          <p:cNvPr id="20" name="Oval 19">
+            <a:extLst>
+              <a:ext uri="{FF2B5EF4-FFF2-40B4-BE49-F238E27FC236}">
+                <a16:creationId xmlns:a16="http://schemas.microsoft.com/office/drawing/2014/main" id="{D511908B-BA21-8274-0917-A98AA88BCB0A}"/>
+              </a:ext>
+            </a:extLst>
+          </p:cNvPr>
+          <p:cNvSpPr/>
+          <p:nvPr/>
+        </p:nvSpPr>
+        <p:spPr>
+          <a:xfrm>
+            <a:off x="7421757" y="3646799"/>
+            <a:ext cx="163286" cy="163286"/>
+          </a:xfrm>
+          <a:prstGeom prst="ellipse">
+            <a:avLst/>
+          </a:prstGeom>
+          <a:solidFill>
+            <a:srgbClr val="FFC000"/>
+          </a:solidFill>
+        </p:spPr>
+        <p:style>
+          <a:lnRef idx="2">
+            <a:schemeClr val="accent1">
+              <a:shade val="15000"/>
+            </a:schemeClr>
+          </a:lnRef>
+          <a:fillRef idx="1">
+            <a:schemeClr val="accent1"/>
+          </a:fillRef>
+          <a:effectRef idx="0">
+            <a:schemeClr val="accent1"/>
+          </a:effectRef>
+          <a:fontRef idx="minor">
+            <a:schemeClr val="lt1"/>
+          </a:fontRef>
+        </p:style>
+        <p:txBody>
+          <a:bodyPr rtlCol="0" anchor="ctr"/>
+          <a:lstStyle/>
+          <a:p>
+            <a:pPr algn="ctr"/>
+            <a:endParaRPr lang="en-US">
+              <a:solidFill>
+                <a:schemeClr val="tx1"/>
+              </a:solidFill>
+            </a:endParaRPr>
+          </a:p>
+        </p:txBody>
+      </p:sp>
+      <p:sp>
+        <p:nvSpPr>
+          <p:cNvPr id="21" name="Oval 20">
+            <a:extLst>
+              <a:ext uri="{FF2B5EF4-FFF2-40B4-BE49-F238E27FC236}">
+                <a16:creationId xmlns:a16="http://schemas.microsoft.com/office/drawing/2014/main" id="{AF212277-B3CE-BD00-57E1-34D99E2B57AE}"/>
+              </a:ext>
+            </a:extLst>
+          </p:cNvPr>
+          <p:cNvSpPr/>
+          <p:nvPr/>
+        </p:nvSpPr>
+        <p:spPr>
+          <a:xfrm>
+            <a:off x="7282968" y="3721781"/>
+            <a:ext cx="163286" cy="163286"/>
+          </a:xfrm>
+          <a:prstGeom prst="ellipse">
+            <a:avLst/>
+          </a:prstGeom>
+          <a:solidFill>
+            <a:srgbClr val="FFC000"/>
+          </a:solidFill>
+        </p:spPr>
+        <p:style>
+          <a:lnRef idx="2">
+            <a:schemeClr val="accent1">
+              <a:shade val="15000"/>
+            </a:schemeClr>
+          </a:lnRef>
+          <a:fillRef idx="1">
+            <a:schemeClr val="accent1"/>
+          </a:fillRef>
+          <a:effectRef idx="0">
+            <a:schemeClr val="accent1"/>
+          </a:effectRef>
+          <a:fontRef idx="minor">
+            <a:schemeClr val="lt1"/>
+          </a:fontRef>
+        </p:style>
+        <p:txBody>
+          <a:bodyPr rtlCol="0" anchor="ctr"/>
+          <a:lstStyle/>
+          <a:p>
+            <a:pPr algn="ctr"/>
+            <a:endParaRPr lang="en-US">
+              <a:solidFill>
+                <a:schemeClr val="tx1"/>
+              </a:solidFill>
+            </a:endParaRPr>
+          </a:p>
+        </p:txBody>
+      </p:sp>
+      <p:sp>
+        <p:nvSpPr>
+          <p:cNvPr id="22" name="Oval 21">
+            <a:extLst>
+              <a:ext uri="{FF2B5EF4-FFF2-40B4-BE49-F238E27FC236}">
+                <a16:creationId xmlns:a16="http://schemas.microsoft.com/office/drawing/2014/main" id="{C0BCF2DF-255F-A010-92A6-7F31582967FE}"/>
+              </a:ext>
+            </a:extLst>
+          </p:cNvPr>
+          <p:cNvSpPr/>
+          <p:nvPr/>
+        </p:nvSpPr>
+        <p:spPr>
+          <a:xfrm>
+            <a:off x="6882497" y="4029121"/>
+            <a:ext cx="163286" cy="163286"/>
+          </a:xfrm>
+          <a:prstGeom prst="ellipse">
+            <a:avLst/>
+          </a:prstGeom>
+          <a:solidFill>
+            <a:srgbClr val="FFC000"/>
+          </a:solidFill>
+        </p:spPr>
+        <p:style>
+          <a:lnRef idx="2">
+            <a:schemeClr val="accent1">
+              <a:shade val="15000"/>
+            </a:schemeClr>
+          </a:lnRef>
+          <a:fillRef idx="1">
+            <a:schemeClr val="accent1"/>
+          </a:fillRef>
+          <a:effectRef idx="0">
+            <a:schemeClr val="accent1"/>
+          </a:effectRef>
+          <a:fontRef idx="minor">
+            <a:schemeClr val="lt1"/>
+          </a:fontRef>
+        </p:style>
+        <p:txBody>
+          <a:bodyPr rtlCol="0" anchor="ctr"/>
+          <a:lstStyle/>
+          <a:p>
+            <a:pPr algn="ctr"/>
+            <a:r>
+              <a:rPr lang="en-US" dirty="0">
+                <a:solidFill>
+                  <a:schemeClr val="tx1"/>
+                </a:solidFill>
+              </a:rPr>
+              <a:t>4</a:t>
+            </a:r>
+          </a:p>
+        </p:txBody>
+      </p:sp>
+      <p:sp>
+        <p:nvSpPr>
+          <p:cNvPr id="23" name="Oval 22">
+            <a:extLst>
+              <a:ext uri="{FF2B5EF4-FFF2-40B4-BE49-F238E27FC236}">
+                <a16:creationId xmlns:a16="http://schemas.microsoft.com/office/drawing/2014/main" id="{24231710-849D-0654-3F0C-9B3DAFD0972E}"/>
+              </a:ext>
+            </a:extLst>
+          </p:cNvPr>
+          <p:cNvSpPr/>
+          <p:nvPr/>
+        </p:nvSpPr>
+        <p:spPr>
+          <a:xfrm>
+            <a:off x="7826829" y="4265974"/>
+            <a:ext cx="163286" cy="163286"/>
+          </a:xfrm>
+          <a:prstGeom prst="ellipse">
+            <a:avLst/>
+          </a:prstGeom>
+          <a:solidFill>
+            <a:srgbClr val="FFC000"/>
+          </a:solidFill>
+        </p:spPr>
+        <p:style>
+          <a:lnRef idx="2">
+            <a:schemeClr val="accent1">
+              <a:shade val="15000"/>
+            </a:schemeClr>
+          </a:lnRef>
+          <a:fillRef idx="1">
+            <a:schemeClr val="accent1"/>
+          </a:fillRef>
+          <a:effectRef idx="0">
+            <a:schemeClr val="accent1"/>
+          </a:effectRef>
+          <a:fontRef idx="minor">
+            <a:schemeClr val="lt1"/>
+          </a:fontRef>
+        </p:style>
+        <p:txBody>
+          <a:bodyPr rtlCol="0" anchor="ctr"/>
+          <a:lstStyle/>
+          <a:p>
+            <a:pPr algn="ctr"/>
+            <a:endParaRPr lang="en-US">
+              <a:solidFill>
+                <a:schemeClr val="tx1"/>
+              </a:solidFill>
+            </a:endParaRPr>
+          </a:p>
+        </p:txBody>
+      </p:sp>
+      <p:sp>
+        <p:nvSpPr>
+          <p:cNvPr id="24" name="Oval 23">
+            <a:extLst>
+              <a:ext uri="{FF2B5EF4-FFF2-40B4-BE49-F238E27FC236}">
+                <a16:creationId xmlns:a16="http://schemas.microsoft.com/office/drawing/2014/main" id="{182025E9-FA3C-4C99-BC44-B95733923803}"/>
+              </a:ext>
+            </a:extLst>
+          </p:cNvPr>
+          <p:cNvSpPr/>
+          <p:nvPr/>
+        </p:nvSpPr>
+        <p:spPr>
+          <a:xfrm>
+            <a:off x="8161566" y="4797967"/>
+            <a:ext cx="163286" cy="163286"/>
+          </a:xfrm>
+          <a:prstGeom prst="ellipse">
+            <a:avLst/>
+          </a:prstGeom>
+          <a:solidFill>
+            <a:srgbClr val="FFC000"/>
+          </a:solidFill>
+        </p:spPr>
+        <p:style>
+          <a:lnRef idx="2">
+            <a:schemeClr val="accent1">
+              <a:shade val="15000"/>
+            </a:schemeClr>
+          </a:lnRef>
+          <a:fillRef idx="1">
+            <a:schemeClr val="accent1"/>
+          </a:fillRef>
+          <a:effectRef idx="0">
+            <a:schemeClr val="accent1"/>
+          </a:effectRef>
+          <a:fontRef idx="minor">
+            <a:schemeClr val="lt1"/>
+          </a:fontRef>
+        </p:style>
+        <p:txBody>
+          <a:bodyPr rtlCol="0" anchor="ctr"/>
+          <a:lstStyle/>
+          <a:p>
+            <a:pPr algn="ctr"/>
+            <a:endParaRPr lang="en-US">
+              <a:solidFill>
+                <a:schemeClr val="tx1"/>
+              </a:solidFill>
+            </a:endParaRPr>
+          </a:p>
+        </p:txBody>
+      </p:sp>
+      <p:sp>
+        <p:nvSpPr>
+          <p:cNvPr id="25" name="Oval 24">
+            <a:extLst>
+              <a:ext uri="{FF2B5EF4-FFF2-40B4-BE49-F238E27FC236}">
+                <a16:creationId xmlns:a16="http://schemas.microsoft.com/office/drawing/2014/main" id="{D47B0667-A021-09E9-C31A-9A46F00382F4}"/>
+              </a:ext>
+            </a:extLst>
+          </p:cNvPr>
+          <p:cNvSpPr/>
+          <p:nvPr/>
+        </p:nvSpPr>
+        <p:spPr>
+          <a:xfrm>
+            <a:off x="8006444" y="4716327"/>
+            <a:ext cx="163286" cy="163286"/>
+          </a:xfrm>
+          <a:prstGeom prst="ellipse">
+            <a:avLst/>
+          </a:prstGeom>
+          <a:solidFill>
+            <a:srgbClr val="FFC000"/>
+          </a:solidFill>
+        </p:spPr>
+        <p:style>
+          <a:lnRef idx="2">
+            <a:schemeClr val="accent1">
+              <a:shade val="15000"/>
+            </a:schemeClr>
+          </a:lnRef>
+          <a:fillRef idx="1">
+            <a:schemeClr val="accent1"/>
+          </a:fillRef>
+          <a:effectRef idx="0">
+            <a:schemeClr val="accent1"/>
+          </a:effectRef>
+          <a:fontRef idx="minor">
+            <a:schemeClr val="lt1"/>
+          </a:fontRef>
+        </p:style>
+        <p:txBody>
+          <a:bodyPr rtlCol="0" anchor="ctr"/>
+          <a:lstStyle/>
+          <a:p>
+            <a:pPr algn="ctr"/>
+            <a:endParaRPr lang="en-US">
+              <a:solidFill>
+                <a:schemeClr val="tx1"/>
+              </a:solidFill>
+            </a:endParaRPr>
+          </a:p>
+        </p:txBody>
+      </p:sp>
+      <p:sp>
+        <p:nvSpPr>
+          <p:cNvPr id="26" name="Oval 25">
+            <a:extLst>
+              <a:ext uri="{FF2B5EF4-FFF2-40B4-BE49-F238E27FC236}">
+                <a16:creationId xmlns:a16="http://schemas.microsoft.com/office/drawing/2014/main" id="{896D5F4A-C994-03DA-E140-2189A267C91B}"/>
+              </a:ext>
+            </a:extLst>
+          </p:cNvPr>
+          <p:cNvSpPr/>
+          <p:nvPr/>
+        </p:nvSpPr>
+        <p:spPr>
+          <a:xfrm>
+            <a:off x="7331950" y="4316275"/>
+            <a:ext cx="163286" cy="163286"/>
+          </a:xfrm>
+          <a:prstGeom prst="ellipse">
+            <a:avLst/>
+          </a:prstGeom>
+          <a:solidFill>
+            <a:srgbClr val="FFC000"/>
+          </a:solidFill>
+        </p:spPr>
+        <p:style>
+          <a:lnRef idx="2">
+            <a:schemeClr val="accent1">
+              <a:shade val="15000"/>
+            </a:schemeClr>
+          </a:lnRef>
+          <a:fillRef idx="1">
+            <a:schemeClr val="accent1"/>
+          </a:fillRef>
+          <a:effectRef idx="0">
+            <a:schemeClr val="accent1"/>
+          </a:effectRef>
+          <a:fontRef idx="minor">
+            <a:schemeClr val="lt1"/>
+          </a:fontRef>
+        </p:style>
+        <p:txBody>
+          <a:bodyPr rtlCol="0" anchor="ctr"/>
+          <a:lstStyle/>
+          <a:p>
+            <a:pPr algn="ctr"/>
+            <a:endParaRPr lang="en-US">
+              <a:solidFill>
+                <a:schemeClr val="tx1"/>
+              </a:solidFill>
+            </a:endParaRPr>
+          </a:p>
+        </p:txBody>
+      </p:sp>
+      <p:sp>
+        <p:nvSpPr>
+          <p:cNvPr id="27" name="Oval 26">
+            <a:extLst>
+              <a:ext uri="{FF2B5EF4-FFF2-40B4-BE49-F238E27FC236}">
+                <a16:creationId xmlns:a16="http://schemas.microsoft.com/office/drawing/2014/main" id="{304DAA7F-D9A9-EEA2-A1E0-E795DA9E6760}"/>
+              </a:ext>
+            </a:extLst>
+          </p:cNvPr>
+          <p:cNvSpPr/>
+          <p:nvPr/>
+        </p:nvSpPr>
+        <p:spPr>
+          <a:xfrm>
+            <a:off x="6610352" y="4553130"/>
+            <a:ext cx="163286" cy="163286"/>
+          </a:xfrm>
+          <a:prstGeom prst="ellipse">
+            <a:avLst/>
+          </a:prstGeom>
+          <a:solidFill>
+            <a:srgbClr val="FFC000"/>
+          </a:solidFill>
+        </p:spPr>
+        <p:style>
+          <a:lnRef idx="2">
+            <a:schemeClr val="accent1">
+              <a:shade val="15000"/>
+            </a:schemeClr>
+          </a:lnRef>
+          <a:fillRef idx="1">
+            <a:schemeClr val="accent1"/>
+          </a:fillRef>
+          <a:effectRef idx="0">
+            <a:schemeClr val="accent1"/>
+          </a:effectRef>
+          <a:fontRef idx="minor">
+            <a:schemeClr val="lt1"/>
+          </a:fontRef>
+        </p:style>
+        <p:txBody>
+          <a:bodyPr rtlCol="0" anchor="ctr"/>
+          <a:lstStyle/>
+          <a:p>
+            <a:pPr algn="ctr"/>
+            <a:endParaRPr lang="en-US">
+              <a:solidFill>
+                <a:schemeClr val="tx1"/>
+              </a:solidFill>
+            </a:endParaRPr>
+          </a:p>
+        </p:txBody>
+      </p:sp>
+      <p:sp>
+        <p:nvSpPr>
+          <p:cNvPr id="28" name="Oval 27">
+            <a:extLst>
+              <a:ext uri="{FF2B5EF4-FFF2-40B4-BE49-F238E27FC236}">
+                <a16:creationId xmlns:a16="http://schemas.microsoft.com/office/drawing/2014/main" id="{568D77CD-57B9-4B6F-7E8A-5B3C3BCBEC0D}"/>
+              </a:ext>
+            </a:extLst>
+          </p:cNvPr>
+          <p:cNvSpPr/>
+          <p:nvPr/>
+        </p:nvSpPr>
+        <p:spPr>
+          <a:xfrm>
+            <a:off x="6504217" y="4683675"/>
+            <a:ext cx="163286" cy="163286"/>
+          </a:xfrm>
+          <a:prstGeom prst="ellipse">
+            <a:avLst/>
+          </a:prstGeom>
+          <a:solidFill>
+            <a:srgbClr val="FFC000"/>
+          </a:solidFill>
+        </p:spPr>
+        <p:style>
+          <a:lnRef idx="2">
+            <a:schemeClr val="accent1">
+              <a:shade val="15000"/>
+            </a:schemeClr>
+          </a:lnRef>
+          <a:fillRef idx="1">
+            <a:schemeClr val="accent1"/>
+          </a:fillRef>
+          <a:effectRef idx="0">
+            <a:schemeClr val="accent1"/>
+          </a:effectRef>
+          <a:fontRef idx="minor">
+            <a:schemeClr val="lt1"/>
+          </a:fontRef>
+        </p:style>
+        <p:txBody>
+          <a:bodyPr rtlCol="0" anchor="ctr"/>
+          <a:lstStyle/>
+          <a:p>
+            <a:pPr algn="ctr"/>
+            <a:endParaRPr lang="en-US">
+              <a:solidFill>
+                <a:schemeClr val="tx1"/>
+              </a:solidFill>
+            </a:endParaRPr>
+          </a:p>
+        </p:txBody>
+      </p:sp>
+      <p:sp>
+        <p:nvSpPr>
+          <p:cNvPr id="29" name="Oval 28">
+            <a:extLst>
+              <a:ext uri="{FF2B5EF4-FFF2-40B4-BE49-F238E27FC236}">
+                <a16:creationId xmlns:a16="http://schemas.microsoft.com/office/drawing/2014/main" id="{7F0AE0DC-A555-9C5D-F1ED-2D464933D298}"/>
+              </a:ext>
+            </a:extLst>
+          </p:cNvPr>
+          <p:cNvSpPr/>
+          <p:nvPr/>
+        </p:nvSpPr>
+        <p:spPr>
+          <a:xfrm>
+            <a:off x="6768194" y="5845628"/>
+            <a:ext cx="163286" cy="163286"/>
+          </a:xfrm>
+          <a:prstGeom prst="ellipse">
+            <a:avLst/>
+          </a:prstGeom>
+          <a:solidFill>
+            <a:srgbClr val="FFC000"/>
+          </a:solidFill>
+        </p:spPr>
+        <p:style>
+          <a:lnRef idx="2">
+            <a:schemeClr val="accent1">
+              <a:shade val="15000"/>
+            </a:schemeClr>
+          </a:lnRef>
+          <a:fillRef idx="1">
+            <a:schemeClr val="accent1"/>
+          </a:fillRef>
+          <a:effectRef idx="0">
+            <a:schemeClr val="accent1"/>
+          </a:effectRef>
+          <a:fontRef idx="minor">
+            <a:schemeClr val="lt1"/>
+          </a:fontRef>
+        </p:style>
+        <p:txBody>
+          <a:bodyPr rtlCol="0" anchor="ctr"/>
+          <a:lstStyle/>
+          <a:p>
+            <a:pPr algn="ctr"/>
+            <a:endParaRPr lang="en-US">
+              <a:solidFill>
+                <a:schemeClr val="tx1"/>
+              </a:solidFill>
+            </a:endParaRPr>
+          </a:p>
+        </p:txBody>
+      </p:sp>
+      <p:sp>
+        <p:nvSpPr>
+          <p:cNvPr id="30" name="Oval 29">
+            <a:extLst>
+              <a:ext uri="{FF2B5EF4-FFF2-40B4-BE49-F238E27FC236}">
+                <a16:creationId xmlns:a16="http://schemas.microsoft.com/office/drawing/2014/main" id="{90A92CCB-BC3C-05E7-1E1D-E748B84CF3E1}"/>
+              </a:ext>
+            </a:extLst>
+          </p:cNvPr>
+          <p:cNvSpPr/>
+          <p:nvPr/>
+        </p:nvSpPr>
+        <p:spPr>
+          <a:xfrm>
+            <a:off x="6610352" y="5915170"/>
+            <a:ext cx="163286" cy="163286"/>
+          </a:xfrm>
+          <a:prstGeom prst="ellipse">
+            <a:avLst/>
+          </a:prstGeom>
+          <a:solidFill>
+            <a:srgbClr val="FFC000"/>
+          </a:solidFill>
+        </p:spPr>
+        <p:style>
+          <a:lnRef idx="2">
+            <a:schemeClr val="accent1">
+              <a:shade val="15000"/>
+            </a:schemeClr>
+          </a:lnRef>
+          <a:fillRef idx="1">
+            <a:schemeClr val="accent1"/>
+          </a:fillRef>
+          <a:effectRef idx="0">
+            <a:schemeClr val="accent1"/>
+          </a:effectRef>
+          <a:fontRef idx="minor">
+            <a:schemeClr val="lt1"/>
+          </a:fontRef>
+        </p:style>
+        <p:txBody>
+          <a:bodyPr rtlCol="0" anchor="ctr"/>
+          <a:lstStyle/>
+          <a:p>
+            <a:pPr algn="ctr"/>
+            <a:endParaRPr lang="en-US">
+              <a:solidFill>
+                <a:schemeClr val="tx1"/>
+              </a:solidFill>
+            </a:endParaRPr>
+          </a:p>
+        </p:txBody>
+      </p:sp>
+      <p:sp>
+        <p:nvSpPr>
+          <p:cNvPr id="31" name="Oval 30">
+            <a:extLst>
+              <a:ext uri="{FF2B5EF4-FFF2-40B4-BE49-F238E27FC236}">
+                <a16:creationId xmlns:a16="http://schemas.microsoft.com/office/drawing/2014/main" id="{0C587E5F-9888-047F-D4F5-420A6C1482A7}"/>
+              </a:ext>
+            </a:extLst>
+          </p:cNvPr>
+          <p:cNvSpPr/>
+          <p:nvPr/>
+        </p:nvSpPr>
+        <p:spPr>
+          <a:xfrm>
+            <a:off x="6094084" y="6078456"/>
+            <a:ext cx="163286" cy="163286"/>
+          </a:xfrm>
+          <a:prstGeom prst="ellipse">
+            <a:avLst/>
+          </a:prstGeom>
+          <a:solidFill>
+            <a:srgbClr val="FFC000"/>
+          </a:solidFill>
+        </p:spPr>
+        <p:style>
+          <a:lnRef idx="2">
+            <a:schemeClr val="accent1">
+              <a:shade val="15000"/>
+            </a:schemeClr>
+          </a:lnRef>
+          <a:fillRef idx="1">
+            <a:schemeClr val="accent1"/>
+          </a:fillRef>
+          <a:effectRef idx="0">
+            <a:schemeClr val="accent1"/>
+          </a:effectRef>
+          <a:fontRef idx="minor">
+            <a:schemeClr val="lt1"/>
+          </a:fontRef>
+        </p:style>
+        <p:txBody>
+          <a:bodyPr rtlCol="0" anchor="ctr"/>
+          <a:lstStyle/>
+          <a:p>
+            <a:pPr algn="ctr"/>
+            <a:endParaRPr lang="en-US">
+              <a:solidFill>
+                <a:schemeClr val="tx1"/>
+              </a:solidFill>
+            </a:endParaRPr>
+          </a:p>
+        </p:txBody>
+      </p:sp>
+      <p:sp>
+        <p:nvSpPr>
+          <p:cNvPr id="32" name="Oval 31">
+            <a:extLst>
+              <a:ext uri="{FF2B5EF4-FFF2-40B4-BE49-F238E27FC236}">
+                <a16:creationId xmlns:a16="http://schemas.microsoft.com/office/drawing/2014/main" id="{754C2960-2275-0CBD-96DC-DCB6A21E6315}"/>
+              </a:ext>
+            </a:extLst>
+          </p:cNvPr>
+          <p:cNvSpPr/>
+          <p:nvPr/>
+        </p:nvSpPr>
+        <p:spPr>
+          <a:xfrm>
+            <a:off x="5930798" y="6146303"/>
+            <a:ext cx="163286" cy="163286"/>
+          </a:xfrm>
+          <a:prstGeom prst="ellipse">
+            <a:avLst/>
+          </a:prstGeom>
+          <a:solidFill>
+            <a:srgbClr val="FFC000"/>
+          </a:solidFill>
+        </p:spPr>
+        <p:style>
+          <a:lnRef idx="2">
+            <a:schemeClr val="accent1">
+              <a:shade val="15000"/>
+            </a:schemeClr>
+          </a:lnRef>
+          <a:fillRef idx="1">
+            <a:schemeClr val="accent1"/>
+          </a:fillRef>
+          <a:effectRef idx="0">
+            <a:schemeClr val="accent1"/>
+          </a:effectRef>
+          <a:fontRef idx="minor">
+            <a:schemeClr val="lt1"/>
+          </a:fontRef>
+        </p:style>
+        <p:txBody>
+          <a:bodyPr rtlCol="0" anchor="ctr"/>
+          <a:lstStyle/>
+          <a:p>
+            <a:pPr algn="ctr"/>
+            <a:endParaRPr lang="en-US" dirty="0">
+              <a:solidFill>
+                <a:schemeClr val="tx1"/>
+              </a:solidFill>
+            </a:endParaRPr>
+          </a:p>
+        </p:txBody>
+      </p:sp>
+      <p:sp>
+        <p:nvSpPr>
+          <p:cNvPr id="33" name="Oval 32">
+            <a:extLst>
+              <a:ext uri="{FF2B5EF4-FFF2-40B4-BE49-F238E27FC236}">
+                <a16:creationId xmlns:a16="http://schemas.microsoft.com/office/drawing/2014/main" id="{81C0D651-2E6F-3E28-7D2E-3F9C0FF39271}"/>
+              </a:ext>
+            </a:extLst>
+          </p:cNvPr>
+          <p:cNvSpPr/>
+          <p:nvPr/>
+        </p:nvSpPr>
+        <p:spPr>
+          <a:xfrm>
+            <a:off x="5479081" y="4958487"/>
+            <a:ext cx="163286" cy="163286"/>
+          </a:xfrm>
+          <a:prstGeom prst="ellipse">
+            <a:avLst/>
+          </a:prstGeom>
+          <a:solidFill>
+            <a:schemeClr val="bg2">
+              <a:lumMod val="50000"/>
+            </a:schemeClr>
+          </a:solidFill>
+        </p:spPr>
+        <p:style>
+          <a:lnRef idx="2">
+            <a:schemeClr val="accent1">
+              <a:shade val="15000"/>
+            </a:schemeClr>
+          </a:lnRef>
+          <a:fillRef idx="1">
+            <a:schemeClr val="accent1"/>
+          </a:fillRef>
+          <a:effectRef idx="0">
+            <a:schemeClr val="accent1"/>
+          </a:effectRef>
+          <a:fontRef idx="minor">
+            <a:schemeClr val="lt1"/>
+          </a:fontRef>
+        </p:style>
+        <p:txBody>
+          <a:bodyPr rtlCol="0" anchor="ctr"/>
+          <a:lstStyle/>
+          <a:p>
+            <a:pPr algn="ctr"/>
+            <a:r>
+              <a:rPr lang="en-US" dirty="0"/>
+              <a:t>2</a:t>
+            </a:r>
+          </a:p>
+        </p:txBody>
+      </p:sp>
+      <p:sp>
+        <p:nvSpPr>
+          <p:cNvPr id="35" name="Oval 34">
+            <a:extLst>
+              <a:ext uri="{FF2B5EF4-FFF2-40B4-BE49-F238E27FC236}">
+                <a16:creationId xmlns:a16="http://schemas.microsoft.com/office/drawing/2014/main" id="{81D70F9F-02AA-0126-AF84-BE0C98061E46}"/>
+              </a:ext>
+            </a:extLst>
+          </p:cNvPr>
+          <p:cNvSpPr/>
+          <p:nvPr/>
+        </p:nvSpPr>
+        <p:spPr>
+          <a:xfrm>
+            <a:off x="4985657" y="4901474"/>
+            <a:ext cx="163286" cy="163286"/>
+          </a:xfrm>
+          <a:prstGeom prst="ellipse">
+            <a:avLst/>
+          </a:prstGeom>
+          <a:solidFill>
+            <a:schemeClr val="bg2">
+              <a:lumMod val="50000"/>
+            </a:schemeClr>
+          </a:solidFill>
+        </p:spPr>
+        <p:style>
+          <a:lnRef idx="2">
+            <a:schemeClr val="accent1">
+              <a:shade val="15000"/>
+            </a:schemeClr>
+          </a:lnRef>
+          <a:fillRef idx="1">
+            <a:schemeClr val="accent1"/>
+          </a:fillRef>
+          <a:effectRef idx="0">
+            <a:schemeClr val="accent1"/>
+          </a:effectRef>
+          <a:fontRef idx="minor">
+            <a:schemeClr val="lt1"/>
+          </a:fontRef>
+        </p:style>
+        <p:txBody>
+          <a:bodyPr rtlCol="0" anchor="ctr"/>
+          <a:lstStyle/>
+          <a:p>
+            <a:pPr algn="ctr"/>
+            <a:r>
+              <a:rPr lang="en-US" dirty="0"/>
+              <a:t>3</a:t>
+            </a:r>
+          </a:p>
+        </p:txBody>
+      </p:sp>
+      <p:sp>
+        <p:nvSpPr>
+          <p:cNvPr id="36" name="Oval 35">
+            <a:extLst>
+              <a:ext uri="{FF2B5EF4-FFF2-40B4-BE49-F238E27FC236}">
+                <a16:creationId xmlns:a16="http://schemas.microsoft.com/office/drawing/2014/main" id="{2A742FFF-D566-FAF1-FF83-5EA22A794CA7}"/>
+              </a:ext>
+            </a:extLst>
+          </p:cNvPr>
+          <p:cNvSpPr/>
+          <p:nvPr/>
+        </p:nvSpPr>
+        <p:spPr>
+          <a:xfrm>
+            <a:off x="5934632" y="5983388"/>
+            <a:ext cx="163286" cy="163286"/>
+          </a:xfrm>
+          <a:prstGeom prst="ellipse">
+            <a:avLst/>
+          </a:prstGeom>
+          <a:solidFill>
+            <a:schemeClr val="tx1"/>
+          </a:solidFill>
+        </p:spPr>
+        <p:style>
+          <a:lnRef idx="2">
+            <a:schemeClr val="accent1">
+              <a:shade val="15000"/>
+            </a:schemeClr>
+          </a:lnRef>
+          <a:fillRef idx="1">
+            <a:schemeClr val="accent1"/>
+          </a:fillRef>
+          <a:effectRef idx="0">
+            <a:schemeClr val="accent1"/>
+          </a:effectRef>
+          <a:fontRef idx="minor">
+            <a:schemeClr val="lt1"/>
+          </a:fontRef>
+        </p:style>
+        <p:txBody>
+          <a:bodyPr rtlCol="0" anchor="ctr"/>
+          <a:lstStyle/>
+          <a:p>
+            <a:pPr algn="ctr"/>
+            <a:endParaRPr lang="en-US" dirty="0"/>
+          </a:p>
+        </p:txBody>
+      </p:sp>
+      <p:sp>
+        <p:nvSpPr>
+          <p:cNvPr id="37" name="Oval 36">
+            <a:extLst>
+              <a:ext uri="{FF2B5EF4-FFF2-40B4-BE49-F238E27FC236}">
+                <a16:creationId xmlns:a16="http://schemas.microsoft.com/office/drawing/2014/main" id="{7C32D484-2168-37E4-A97D-80C701E29AD1}"/>
+              </a:ext>
+            </a:extLst>
+          </p:cNvPr>
+          <p:cNvSpPr/>
+          <p:nvPr/>
+        </p:nvSpPr>
+        <p:spPr>
+          <a:xfrm>
+            <a:off x="6610355" y="5755779"/>
+            <a:ext cx="163286" cy="163286"/>
+          </a:xfrm>
+          <a:prstGeom prst="ellipse">
+            <a:avLst/>
+          </a:prstGeom>
+          <a:solidFill>
+            <a:schemeClr val="bg2">
+              <a:lumMod val="50000"/>
+            </a:schemeClr>
+          </a:solidFill>
+        </p:spPr>
+        <p:style>
+          <a:lnRef idx="2">
+            <a:schemeClr val="accent1">
+              <a:shade val="15000"/>
+            </a:schemeClr>
+          </a:lnRef>
+          <a:fillRef idx="1">
+            <a:schemeClr val="accent1"/>
+          </a:fillRef>
+          <a:effectRef idx="0">
+            <a:schemeClr val="accent1"/>
+          </a:effectRef>
+          <a:fontRef idx="minor">
+            <a:schemeClr val="lt1"/>
+          </a:fontRef>
+        </p:style>
+        <p:txBody>
+          <a:bodyPr rtlCol="0" anchor="ctr"/>
+          <a:lstStyle/>
+          <a:p>
+            <a:pPr algn="ctr"/>
+            <a:r>
+              <a:rPr lang="en-US" dirty="0"/>
+              <a:t>1</a:t>
+            </a:r>
+          </a:p>
+        </p:txBody>
+      </p:sp>
+      <p:sp>
+        <p:nvSpPr>
+          <p:cNvPr id="38" name="Oval 37">
+            <a:extLst>
+              <a:ext uri="{FF2B5EF4-FFF2-40B4-BE49-F238E27FC236}">
+                <a16:creationId xmlns:a16="http://schemas.microsoft.com/office/drawing/2014/main" id="{1D490D53-0B6F-4558-3A7C-3CF5D4D06840}"/>
+              </a:ext>
+            </a:extLst>
+          </p:cNvPr>
+          <p:cNvSpPr/>
+          <p:nvPr/>
+        </p:nvSpPr>
+        <p:spPr>
+          <a:xfrm>
+            <a:off x="8995167" y="5771115"/>
+            <a:ext cx="163286" cy="163286"/>
+          </a:xfrm>
+          <a:prstGeom prst="ellipse">
+            <a:avLst/>
+          </a:prstGeom>
+          <a:solidFill>
+            <a:schemeClr val="bg2">
+              <a:lumMod val="10000"/>
+            </a:schemeClr>
+          </a:solidFill>
+        </p:spPr>
+        <p:style>
+          <a:lnRef idx="2">
+            <a:schemeClr val="accent1">
+              <a:shade val="15000"/>
+            </a:schemeClr>
+          </a:lnRef>
+          <a:fillRef idx="1">
+            <a:schemeClr val="accent1"/>
+          </a:fillRef>
+          <a:effectRef idx="0">
+            <a:schemeClr val="accent1"/>
+          </a:effectRef>
+          <a:fontRef idx="minor">
+            <a:schemeClr val="lt1"/>
+          </a:fontRef>
+        </p:style>
+        <p:txBody>
+          <a:bodyPr rtlCol="0" anchor="ctr"/>
+          <a:lstStyle/>
+          <a:p>
+            <a:pPr algn="ctr"/>
+            <a:endParaRPr lang="en-US"/>
+          </a:p>
+        </p:txBody>
+      </p:sp>
+      <p:sp>
+        <p:nvSpPr>
+          <p:cNvPr id="39" name="Oval 38">
+            <a:extLst>
+              <a:ext uri="{FF2B5EF4-FFF2-40B4-BE49-F238E27FC236}">
+                <a16:creationId xmlns:a16="http://schemas.microsoft.com/office/drawing/2014/main" id="{71CBD758-8BAF-E9BB-1C6A-5EA7065C88E0}"/>
+              </a:ext>
+            </a:extLst>
+          </p:cNvPr>
+          <p:cNvSpPr/>
+          <p:nvPr/>
+        </p:nvSpPr>
+        <p:spPr>
+          <a:xfrm>
+            <a:off x="7859485" y="4435979"/>
+            <a:ext cx="163286" cy="163286"/>
+          </a:xfrm>
+          <a:prstGeom prst="ellipse">
+            <a:avLst/>
+          </a:prstGeom>
+          <a:solidFill>
+            <a:schemeClr val="bg2">
+              <a:lumMod val="50000"/>
+            </a:schemeClr>
+          </a:solidFill>
+        </p:spPr>
+        <p:style>
+          <a:lnRef idx="2">
+            <a:schemeClr val="accent1">
+              <a:shade val="15000"/>
+            </a:schemeClr>
+          </a:lnRef>
+          <a:fillRef idx="1">
+            <a:schemeClr val="accent1"/>
+          </a:fillRef>
+          <a:effectRef idx="0">
+            <a:schemeClr val="accent1"/>
+          </a:effectRef>
+          <a:fontRef idx="minor">
+            <a:schemeClr val="lt1"/>
+          </a:fontRef>
+        </p:style>
+        <p:txBody>
+          <a:bodyPr rtlCol="0" anchor="ctr"/>
+          <a:lstStyle/>
+          <a:p>
+            <a:pPr algn="ctr"/>
+            <a:r>
+              <a:rPr lang="en-US" dirty="0"/>
+              <a:t>5</a:t>
+            </a:r>
+          </a:p>
+        </p:txBody>
+      </p:sp>
+      <p:sp>
+        <p:nvSpPr>
+          <p:cNvPr id="40" name="Oval 39">
+            <a:extLst>
+              <a:ext uri="{FF2B5EF4-FFF2-40B4-BE49-F238E27FC236}">
+                <a16:creationId xmlns:a16="http://schemas.microsoft.com/office/drawing/2014/main" id="{46280A80-9EAE-5620-8A58-B630E6640283}"/>
+              </a:ext>
+            </a:extLst>
+          </p:cNvPr>
+          <p:cNvSpPr/>
+          <p:nvPr/>
+        </p:nvSpPr>
+        <p:spPr>
+          <a:xfrm>
+            <a:off x="6371710" y="3223622"/>
+            <a:ext cx="163286" cy="163286"/>
+          </a:xfrm>
+          <a:prstGeom prst="ellipse">
+            <a:avLst/>
+          </a:prstGeom>
+          <a:solidFill>
+            <a:schemeClr val="bg2">
+              <a:lumMod val="50000"/>
+            </a:schemeClr>
+          </a:solidFill>
+        </p:spPr>
+        <p:style>
+          <a:lnRef idx="2">
+            <a:schemeClr val="accent1">
+              <a:shade val="15000"/>
+            </a:schemeClr>
+          </a:lnRef>
+          <a:fillRef idx="1">
+            <a:schemeClr val="accent1"/>
+          </a:fillRef>
+          <a:effectRef idx="0">
+            <a:schemeClr val="accent1"/>
+          </a:effectRef>
+          <a:fontRef idx="minor">
+            <a:schemeClr val="lt1"/>
+          </a:fontRef>
+        </p:style>
+        <p:txBody>
+          <a:bodyPr rtlCol="0" anchor="ctr"/>
+          <a:lstStyle/>
+          <a:p>
+            <a:pPr algn="ctr"/>
+            <a:r>
+              <a:rPr lang="en-US" dirty="0"/>
+              <a:t>4</a:t>
+            </a:r>
+          </a:p>
+        </p:txBody>
+      </p:sp>
+      <p:sp>
+        <p:nvSpPr>
+          <p:cNvPr id="41" name="Oval 40">
+            <a:extLst>
+              <a:ext uri="{FF2B5EF4-FFF2-40B4-BE49-F238E27FC236}">
+                <a16:creationId xmlns:a16="http://schemas.microsoft.com/office/drawing/2014/main" id="{8097E9EC-74F3-848B-415A-05B1C1301332}"/>
+              </a:ext>
+            </a:extLst>
+          </p:cNvPr>
+          <p:cNvSpPr/>
+          <p:nvPr/>
+        </p:nvSpPr>
+        <p:spPr>
+          <a:xfrm>
+            <a:off x="8169730" y="2863829"/>
+            <a:ext cx="163286" cy="163286"/>
+          </a:xfrm>
+          <a:prstGeom prst="ellipse">
+            <a:avLst/>
+          </a:prstGeom>
+          <a:solidFill>
+            <a:schemeClr val="bg2">
+              <a:lumMod val="10000"/>
+            </a:schemeClr>
+          </a:solidFill>
+        </p:spPr>
+        <p:style>
+          <a:lnRef idx="2">
+            <a:schemeClr val="accent1">
+              <a:shade val="15000"/>
+            </a:schemeClr>
+          </a:lnRef>
+          <a:fillRef idx="1">
+            <a:schemeClr val="accent1"/>
+          </a:fillRef>
+          <a:effectRef idx="0">
+            <a:schemeClr val="accent1"/>
+          </a:effectRef>
+          <a:fontRef idx="minor">
+            <a:schemeClr val="lt1"/>
+          </a:fontRef>
+        </p:style>
+        <p:txBody>
+          <a:bodyPr rtlCol="0" anchor="ctr"/>
+          <a:lstStyle/>
+          <a:p>
+            <a:pPr algn="ctr"/>
+            <a:endParaRPr lang="en-US"/>
+          </a:p>
+        </p:txBody>
+      </p:sp>
+      <p:sp>
+        <p:nvSpPr>
+          <p:cNvPr id="42" name="Oval 41">
+            <a:extLst>
+              <a:ext uri="{FF2B5EF4-FFF2-40B4-BE49-F238E27FC236}">
+                <a16:creationId xmlns:a16="http://schemas.microsoft.com/office/drawing/2014/main" id="{4C035A04-FF41-0759-C94D-5041ECCF2F7F}"/>
+              </a:ext>
+            </a:extLst>
+          </p:cNvPr>
+          <p:cNvSpPr/>
+          <p:nvPr/>
+        </p:nvSpPr>
+        <p:spPr>
+          <a:xfrm>
+            <a:off x="8328207" y="919933"/>
+            <a:ext cx="163286" cy="163286"/>
+          </a:xfrm>
+          <a:prstGeom prst="ellipse">
+            <a:avLst/>
+          </a:prstGeom>
+          <a:solidFill>
+            <a:schemeClr val="bg2">
+              <a:lumMod val="10000"/>
+            </a:schemeClr>
+          </a:solidFill>
+        </p:spPr>
+        <p:style>
+          <a:lnRef idx="2">
+            <a:schemeClr val="accent1">
+              <a:shade val="15000"/>
+            </a:schemeClr>
+          </a:lnRef>
+          <a:fillRef idx="1">
+            <a:schemeClr val="accent1"/>
+          </a:fillRef>
+          <a:effectRef idx="0">
+            <a:schemeClr val="accent1"/>
+          </a:effectRef>
+          <a:fontRef idx="minor">
+            <a:schemeClr val="lt1"/>
+          </a:fontRef>
+        </p:style>
+        <p:txBody>
+          <a:bodyPr rtlCol="0" anchor="ctr"/>
+          <a:lstStyle/>
+          <a:p>
+            <a:pPr algn="ctr"/>
+            <a:endParaRPr lang="en-US"/>
+          </a:p>
+        </p:txBody>
+      </p:sp>
+      <p:sp>
+        <p:nvSpPr>
+          <p:cNvPr id="43" name="Rectangle 42">
+            <a:extLst>
+              <a:ext uri="{FF2B5EF4-FFF2-40B4-BE49-F238E27FC236}">
+                <a16:creationId xmlns:a16="http://schemas.microsoft.com/office/drawing/2014/main" id="{8F5A8C90-2BBA-9909-4664-9B7DBF7B9BB2}"/>
+              </a:ext>
+            </a:extLst>
+          </p:cNvPr>
+          <p:cNvSpPr/>
+          <p:nvPr/>
+        </p:nvSpPr>
+        <p:spPr>
+          <a:xfrm>
+            <a:off x="5912052" y="5167076"/>
+            <a:ext cx="370615" cy="523220"/>
+          </a:xfrm>
+          <a:prstGeom prst="rect">
+            <a:avLst/>
+          </a:prstGeom>
+          <a:noFill/>
+        </p:spPr>
+        <p:txBody>
+          <a:bodyPr wrap="none" lIns="91440" tIns="45720" rIns="91440" bIns="45720">
+            <a:spAutoFit/>
+          </a:bodyPr>
+          <a:lstStyle/>
+          <a:p>
+            <a:pPr algn="ctr"/>
+            <a:r>
               <a:rPr lang="en-US" sz="2800" b="0" cap="none" spc="0" dirty="0">
                 <a:ln w="0"/>
                 <a:solidFill>
@@ -3813,27 +5931,27 @@
                   </a:outerShdw>
                 </a:effectLst>
               </a:rPr>
-              <a:t>8</a:t>
-            </a:r>
-          </a:p>
-        </p:txBody>
-      </p:sp>
-      <p:sp>
-        <p:nvSpPr>
-          <p:cNvPr id="15" name="Rectangle 14">
-            <a:extLst>
-              <a:ext uri="{FF2B5EF4-FFF2-40B4-BE49-F238E27FC236}">
-                <a16:creationId xmlns:a16="http://schemas.microsoft.com/office/drawing/2014/main" id="{6A2C7282-F1DB-1B6A-DAC6-192ED7C0C132}"/>
-              </a:ext>
-            </a:extLst>
-          </p:cNvPr>
-          <p:cNvSpPr/>
+              <a:t>X</a:t>
+            </a:r>
+          </a:p>
+        </p:txBody>
+      </p:sp>
+      <p:sp>
+        <p:nvSpPr>
+          <p:cNvPr id="44" name="TextBox 43">
+            <a:extLst>
+              <a:ext uri="{FF2B5EF4-FFF2-40B4-BE49-F238E27FC236}">
+                <a16:creationId xmlns:a16="http://schemas.microsoft.com/office/drawing/2014/main" id="{5AF0419C-BB96-C870-7661-8F035A093908}"/>
+              </a:ext>
+            </a:extLst>
+          </p:cNvPr>
+          <p:cNvSpPr txBox="1"/>
           <p:nvPr/>
         </p:nvSpPr>
         <p:spPr>
           <a:xfrm>
-            <a:off x="5249389" y="1830010"/>
-            <a:ext cx="367408" cy="523220"/>
+            <a:off x="5789989" y="6192770"/>
+            <a:ext cx="418704" cy="369332"/>
           </a:xfrm>
           <a:prstGeom prst="rect">
             <a:avLst/>
@@ -3841,47 +5959,34 @@
           <a:noFill/>
         </p:spPr>
         <p:txBody>
-          <a:bodyPr wrap="none" lIns="91440" tIns="45720" rIns="91440" bIns="45720">
+          <a:bodyPr wrap="none" rtlCol="0">
             <a:spAutoFit/>
           </a:bodyPr>
           <a:lstStyle/>
           <a:p>
-            <a:pPr algn="ctr"/>
-            <a:r>
-              <a:rPr lang="en-US" sz="2800" b="0" cap="none" spc="0" dirty="0">
-                <a:ln w="0"/>
-                <a:solidFill>
-                  <a:schemeClr val="tx1"/>
-                </a:solidFill>
-                <a:effectLst>
-                  <a:outerShdw blurRad="38100" dist="19050" dir="2700000" algn="tl" rotWithShape="0">
-                    <a:schemeClr val="dk1">
-                      <a:alpha val="40000"/>
-                    </a:schemeClr>
-                  </a:outerShdw>
-                </a:effectLst>
-              </a:rPr>
-              <a:t>9</a:t>
-            </a:r>
-          </a:p>
-        </p:txBody>
-      </p:sp>
-      <p:sp>
-        <p:nvSpPr>
-          <p:cNvPr id="16" name="Rectangle 15">
-            <a:extLst>
-              <a:ext uri="{FF2B5EF4-FFF2-40B4-BE49-F238E27FC236}">
-                <a16:creationId xmlns:a16="http://schemas.microsoft.com/office/drawing/2014/main" id="{3AE88115-682D-7A4B-C123-26805C6429F9}"/>
-              </a:ext>
-            </a:extLst>
-          </p:cNvPr>
-          <p:cNvSpPr/>
+            <a:r>
+              <a:rPr lang="en-US" dirty="0"/>
+              <a:t>10</a:t>
+            </a:r>
+          </a:p>
+        </p:txBody>
+      </p:sp>
+      <p:sp>
+        <p:nvSpPr>
+          <p:cNvPr id="45" name="TextBox 44">
+            <a:extLst>
+              <a:ext uri="{FF2B5EF4-FFF2-40B4-BE49-F238E27FC236}">
+                <a16:creationId xmlns:a16="http://schemas.microsoft.com/office/drawing/2014/main" id="{593762A9-A46F-5727-9E76-0A9A0570AF7F}"/>
+              </a:ext>
+            </a:extLst>
+          </p:cNvPr>
+          <p:cNvSpPr txBox="1"/>
           <p:nvPr/>
         </p:nvSpPr>
         <p:spPr>
           <a:xfrm>
-            <a:off x="5721795" y="1830010"/>
-            <a:ext cx="550151" cy="523220"/>
+            <a:off x="6085513" y="6108554"/>
+            <a:ext cx="418704" cy="369332"/>
           </a:xfrm>
           <a:prstGeom prst="rect">
             <a:avLst/>
@@ -3889,45 +5994,407 @@
           <a:noFill/>
         </p:spPr>
         <p:txBody>
-          <a:bodyPr wrap="none" lIns="91440" tIns="45720" rIns="91440" bIns="45720">
+          <a:bodyPr wrap="none" rtlCol="0">
             <a:spAutoFit/>
           </a:bodyPr>
           <a:lstStyle/>
           <a:p>
-            <a:pPr algn="ctr"/>
-            <a:r>
-              <a:rPr lang="en-US" sz="2800" dirty="0">
-                <a:ln w="0"/>
-                <a:effectLst>
-                  <a:outerShdw blurRad="38100" dist="19050" dir="2700000" algn="tl" rotWithShape="0">
-                    <a:schemeClr val="dk1">
-                      <a:alpha val="40000"/>
-                    </a:schemeClr>
-                  </a:outerShdw>
-                </a:effectLst>
-              </a:rPr>
-              <a:t>10</a:t>
-            </a:r>
-            <a:endParaRPr lang="en-US" sz="2800" b="0" cap="none" spc="0" dirty="0">
-              <a:ln w="0"/>
-              <a:solidFill>
-                <a:schemeClr val="tx1"/>
-              </a:solidFill>
-              <a:effectLst>
-                <a:outerShdw blurRad="38100" dist="19050" dir="2700000" algn="tl" rotWithShape="0">
-                  <a:schemeClr val="dk1">
-                    <a:alpha val="40000"/>
-                  </a:schemeClr>
-                </a:outerShdw>
-              </a:effectLst>
-            </a:endParaRPr>
+            <a:r>
+              <a:rPr lang="en-US" dirty="0"/>
+              <a:t>12</a:t>
+            </a:r>
+          </a:p>
+        </p:txBody>
+      </p:sp>
+      <p:sp>
+        <p:nvSpPr>
+          <p:cNvPr id="46" name="TextBox 45">
+            <a:extLst>
+              <a:ext uri="{FF2B5EF4-FFF2-40B4-BE49-F238E27FC236}">
+                <a16:creationId xmlns:a16="http://schemas.microsoft.com/office/drawing/2014/main" id="{BA923280-0BD6-66C1-DDD2-C4828E912C18}"/>
+              </a:ext>
+            </a:extLst>
+          </p:cNvPr>
+          <p:cNvSpPr txBox="1"/>
+          <p:nvPr/>
+        </p:nvSpPr>
+        <p:spPr>
+          <a:xfrm>
+            <a:off x="6669115" y="5927113"/>
+            <a:ext cx="418704" cy="369332"/>
+          </a:xfrm>
+          <a:prstGeom prst="rect">
+            <a:avLst/>
+          </a:prstGeom>
+          <a:noFill/>
+        </p:spPr>
+        <p:txBody>
+          <a:bodyPr wrap="none" rtlCol="0">
+            <a:spAutoFit/>
+          </a:bodyPr>
+          <a:lstStyle/>
+          <a:p>
+            <a:r>
+              <a:rPr lang="en-US" dirty="0"/>
+              <a:t>13</a:t>
+            </a:r>
+          </a:p>
+        </p:txBody>
+      </p:sp>
+      <p:sp>
+        <p:nvSpPr>
+          <p:cNvPr id="47" name="TextBox 46">
+            <a:extLst>
+              <a:ext uri="{FF2B5EF4-FFF2-40B4-BE49-F238E27FC236}">
+                <a16:creationId xmlns:a16="http://schemas.microsoft.com/office/drawing/2014/main" id="{911D72CB-4F26-7674-FFCD-B1CEAC8825D9}"/>
+              </a:ext>
+            </a:extLst>
+          </p:cNvPr>
+          <p:cNvSpPr txBox="1"/>
+          <p:nvPr/>
+        </p:nvSpPr>
+        <p:spPr>
+          <a:xfrm>
+            <a:off x="6416208" y="4747372"/>
+            <a:ext cx="418704" cy="369332"/>
+          </a:xfrm>
+          <a:prstGeom prst="rect">
+            <a:avLst/>
+          </a:prstGeom>
+          <a:noFill/>
+        </p:spPr>
+        <p:txBody>
+          <a:bodyPr wrap="none" rtlCol="0">
+            <a:spAutoFit/>
+          </a:bodyPr>
+          <a:lstStyle/>
+          <a:p>
+            <a:r>
+              <a:rPr lang="en-US" dirty="0"/>
+              <a:t>14</a:t>
+            </a:r>
+          </a:p>
+        </p:txBody>
+      </p:sp>
+      <p:sp>
+        <p:nvSpPr>
+          <p:cNvPr id="48" name="TextBox 47">
+            <a:extLst>
+              <a:ext uri="{FF2B5EF4-FFF2-40B4-BE49-F238E27FC236}">
+                <a16:creationId xmlns:a16="http://schemas.microsoft.com/office/drawing/2014/main" id="{2CAC76E4-37E7-9F5A-F10B-3975AF092A72}"/>
+              </a:ext>
+            </a:extLst>
+          </p:cNvPr>
+          <p:cNvSpPr txBox="1"/>
+          <p:nvPr/>
+        </p:nvSpPr>
+        <p:spPr>
+          <a:xfrm>
+            <a:off x="6660873" y="4549837"/>
+            <a:ext cx="418704" cy="369332"/>
+          </a:xfrm>
+          <a:prstGeom prst="rect">
+            <a:avLst/>
+          </a:prstGeom>
+          <a:noFill/>
+        </p:spPr>
+        <p:txBody>
+          <a:bodyPr wrap="none" rtlCol="0">
+            <a:spAutoFit/>
+          </a:bodyPr>
+          <a:lstStyle/>
+          <a:p>
+            <a:r>
+              <a:rPr lang="en-US" dirty="0"/>
+              <a:t>16</a:t>
+            </a:r>
+          </a:p>
+        </p:txBody>
+      </p:sp>
+      <p:sp>
+        <p:nvSpPr>
+          <p:cNvPr id="49" name="TextBox 48">
+            <a:extLst>
+              <a:ext uri="{FF2B5EF4-FFF2-40B4-BE49-F238E27FC236}">
+                <a16:creationId xmlns:a16="http://schemas.microsoft.com/office/drawing/2014/main" id="{90F5E1C0-8227-0363-90AB-11CB47C6C8E5}"/>
+              </a:ext>
+            </a:extLst>
+          </p:cNvPr>
+          <p:cNvSpPr txBox="1"/>
+          <p:nvPr/>
+        </p:nvSpPr>
+        <p:spPr>
+          <a:xfrm>
+            <a:off x="7204021" y="4430718"/>
+            <a:ext cx="418704" cy="369332"/>
+          </a:xfrm>
+          <a:prstGeom prst="rect">
+            <a:avLst/>
+          </a:prstGeom>
+          <a:noFill/>
+        </p:spPr>
+        <p:txBody>
+          <a:bodyPr wrap="none" rtlCol="0">
+            <a:spAutoFit/>
+          </a:bodyPr>
+          <a:lstStyle/>
+          <a:p>
+            <a:r>
+              <a:rPr lang="en-US" dirty="0"/>
+              <a:t>17</a:t>
+            </a:r>
+          </a:p>
+        </p:txBody>
+      </p:sp>
+      <p:sp>
+        <p:nvSpPr>
+          <p:cNvPr id="50" name="TextBox 49">
+            <a:extLst>
+              <a:ext uri="{FF2B5EF4-FFF2-40B4-BE49-F238E27FC236}">
+                <a16:creationId xmlns:a16="http://schemas.microsoft.com/office/drawing/2014/main" id="{4049835B-010E-3B88-1510-2FB9FFD80A1C}"/>
+              </a:ext>
+            </a:extLst>
+          </p:cNvPr>
+          <p:cNvSpPr txBox="1"/>
+          <p:nvPr/>
+        </p:nvSpPr>
+        <p:spPr>
+          <a:xfrm>
+            <a:off x="7813419" y="4817892"/>
+            <a:ext cx="418704" cy="369332"/>
+          </a:xfrm>
+          <a:prstGeom prst="rect">
+            <a:avLst/>
+          </a:prstGeom>
+          <a:noFill/>
+        </p:spPr>
+        <p:txBody>
+          <a:bodyPr wrap="none" rtlCol="0">
+            <a:spAutoFit/>
+          </a:bodyPr>
+          <a:lstStyle/>
+          <a:p>
+            <a:r>
+              <a:rPr lang="en-US" dirty="0"/>
+              <a:t>18</a:t>
+            </a:r>
+          </a:p>
+        </p:txBody>
+      </p:sp>
+      <p:sp>
+        <p:nvSpPr>
+          <p:cNvPr id="51" name="TextBox 50">
+            <a:extLst>
+              <a:ext uri="{FF2B5EF4-FFF2-40B4-BE49-F238E27FC236}">
+                <a16:creationId xmlns:a16="http://schemas.microsoft.com/office/drawing/2014/main" id="{9FA04911-DDA5-5CCA-E5D8-D5C26E4EF50F}"/>
+              </a:ext>
+            </a:extLst>
+          </p:cNvPr>
+          <p:cNvSpPr txBox="1"/>
+          <p:nvPr/>
+        </p:nvSpPr>
+        <p:spPr>
+          <a:xfrm>
+            <a:off x="7698576" y="3971995"/>
+            <a:ext cx="418704" cy="369332"/>
+          </a:xfrm>
+          <a:prstGeom prst="rect">
+            <a:avLst/>
+          </a:prstGeom>
+          <a:noFill/>
+        </p:spPr>
+        <p:txBody>
+          <a:bodyPr wrap="none" rtlCol="0">
+            <a:spAutoFit/>
+          </a:bodyPr>
+          <a:lstStyle/>
+          <a:p>
+            <a:r>
+              <a:rPr lang="en-US" dirty="0"/>
+              <a:t>19</a:t>
+            </a:r>
+          </a:p>
+        </p:txBody>
+      </p:sp>
+      <p:sp>
+        <p:nvSpPr>
+          <p:cNvPr id="52" name="TextBox 51">
+            <a:extLst>
+              <a:ext uri="{FF2B5EF4-FFF2-40B4-BE49-F238E27FC236}">
+                <a16:creationId xmlns:a16="http://schemas.microsoft.com/office/drawing/2014/main" id="{519EAF58-58BB-09E9-1277-5DAF65F0D343}"/>
+              </a:ext>
+            </a:extLst>
+          </p:cNvPr>
+          <p:cNvSpPr txBox="1"/>
+          <p:nvPr/>
+        </p:nvSpPr>
+        <p:spPr>
+          <a:xfrm>
+            <a:off x="7171784" y="3788560"/>
+            <a:ext cx="418704" cy="369332"/>
+          </a:xfrm>
+          <a:prstGeom prst="rect">
+            <a:avLst/>
+          </a:prstGeom>
+          <a:noFill/>
+        </p:spPr>
+        <p:txBody>
+          <a:bodyPr wrap="none" rtlCol="0">
+            <a:spAutoFit/>
+          </a:bodyPr>
+          <a:lstStyle/>
+          <a:p>
+            <a:r>
+              <a:rPr lang="en-US" dirty="0"/>
+              <a:t>20</a:t>
+            </a:r>
+          </a:p>
+        </p:txBody>
+      </p:sp>
+      <p:sp>
+        <p:nvSpPr>
+          <p:cNvPr id="53" name="TextBox 52">
+            <a:extLst>
+              <a:ext uri="{FF2B5EF4-FFF2-40B4-BE49-F238E27FC236}">
+                <a16:creationId xmlns:a16="http://schemas.microsoft.com/office/drawing/2014/main" id="{3B656D96-FFD0-E829-C6D5-85D2D527745E}"/>
+              </a:ext>
+            </a:extLst>
+          </p:cNvPr>
+          <p:cNvSpPr txBox="1"/>
+          <p:nvPr/>
+        </p:nvSpPr>
+        <p:spPr>
+          <a:xfrm>
+            <a:off x="7865336" y="3482820"/>
+            <a:ext cx="418704" cy="369332"/>
+          </a:xfrm>
+          <a:prstGeom prst="rect">
+            <a:avLst/>
+          </a:prstGeom>
+          <a:noFill/>
+        </p:spPr>
+        <p:txBody>
+          <a:bodyPr wrap="none" rtlCol="0">
+            <a:spAutoFit/>
+          </a:bodyPr>
+          <a:lstStyle/>
+          <a:p>
+            <a:r>
+              <a:rPr lang="en-US" dirty="0"/>
+              <a:t>22</a:t>
+            </a:r>
+          </a:p>
+        </p:txBody>
+      </p:sp>
+      <p:sp>
+        <p:nvSpPr>
+          <p:cNvPr id="54" name="TextBox 53">
+            <a:extLst>
+              <a:ext uri="{FF2B5EF4-FFF2-40B4-BE49-F238E27FC236}">
+                <a16:creationId xmlns:a16="http://schemas.microsoft.com/office/drawing/2014/main" id="{96FC2035-E576-5C36-68B7-5EDF3CCBFEF8}"/>
+              </a:ext>
+            </a:extLst>
+          </p:cNvPr>
+          <p:cNvSpPr txBox="1"/>
+          <p:nvPr/>
+        </p:nvSpPr>
+        <p:spPr>
+          <a:xfrm>
+            <a:off x="7363450" y="3332390"/>
+            <a:ext cx="418704" cy="369332"/>
+          </a:xfrm>
+          <a:prstGeom prst="rect">
+            <a:avLst/>
+          </a:prstGeom>
+          <a:noFill/>
+        </p:spPr>
+        <p:txBody>
+          <a:bodyPr wrap="none" rtlCol="0">
+            <a:spAutoFit/>
+          </a:bodyPr>
+          <a:lstStyle/>
+          <a:p>
+            <a:r>
+              <a:rPr lang="en-US" dirty="0"/>
+              <a:t>23</a:t>
+            </a:r>
+          </a:p>
+        </p:txBody>
+      </p:sp>
+      <p:sp>
+        <p:nvSpPr>
+          <p:cNvPr id="55" name="TextBox 54">
+            <a:extLst>
+              <a:ext uri="{FF2B5EF4-FFF2-40B4-BE49-F238E27FC236}">
+                <a16:creationId xmlns:a16="http://schemas.microsoft.com/office/drawing/2014/main" id="{9F228C29-06EA-DDF2-BFA0-F38F150ED48C}"/>
+              </a:ext>
+            </a:extLst>
+          </p:cNvPr>
+          <p:cNvSpPr txBox="1"/>
+          <p:nvPr/>
+        </p:nvSpPr>
+        <p:spPr>
+          <a:xfrm>
+            <a:off x="7976705" y="2357013"/>
+            <a:ext cx="418704" cy="369332"/>
+          </a:xfrm>
+          <a:prstGeom prst="rect">
+            <a:avLst/>
+          </a:prstGeom>
+          <a:noFill/>
+        </p:spPr>
+        <p:txBody>
+          <a:bodyPr wrap="none" rtlCol="0">
+            <a:spAutoFit/>
+          </a:bodyPr>
+          <a:lstStyle/>
+          <a:p>
+            <a:r>
+              <a:rPr lang="en-US" dirty="0"/>
+              <a:t>24</a:t>
+            </a:r>
+          </a:p>
+        </p:txBody>
+      </p:sp>
+      <p:sp>
+        <p:nvSpPr>
+          <p:cNvPr id="56" name="TextBox 55">
+            <a:extLst>
+              <a:ext uri="{FF2B5EF4-FFF2-40B4-BE49-F238E27FC236}">
+                <a16:creationId xmlns:a16="http://schemas.microsoft.com/office/drawing/2014/main" id="{9A8934F3-AF6F-3D7C-A1E0-94A1A056A82B}"/>
+              </a:ext>
+            </a:extLst>
+          </p:cNvPr>
+          <p:cNvSpPr txBox="1"/>
+          <p:nvPr/>
+        </p:nvSpPr>
+        <p:spPr>
+          <a:xfrm>
+            <a:off x="7813419" y="1102255"/>
+            <a:ext cx="418704" cy="369332"/>
+          </a:xfrm>
+          <a:prstGeom prst="rect">
+            <a:avLst/>
+          </a:prstGeom>
+          <a:noFill/>
+        </p:spPr>
+        <p:txBody>
+          <a:bodyPr wrap="none" rtlCol="0">
+            <a:spAutoFit/>
+          </a:bodyPr>
+          <a:lstStyle/>
+          <a:p>
+            <a:r>
+              <a:rPr lang="en-US" dirty="0"/>
+              <a:t>25</a:t>
+            </a:r>
           </a:p>
         </p:txBody>
       </p:sp>
     </p:spTree>
     <p:extLst>
       <p:ext uri="{BB962C8B-B14F-4D97-AF65-F5344CB8AC3E}">
-        <p14:creationId xmlns:p14="http://schemas.microsoft.com/office/powerpoint/2010/main" val="3214210540"/>
+        <p14:creationId xmlns:p14="http://schemas.microsoft.com/office/powerpoint/2010/main" val="3756243765"/>
       </p:ext>
     </p:extLst>
   </p:cSld>

</xml_diff>

<commit_message>
H3 Goldfeather, bug fixes
H3 Goldfeather, bug fixes
</commit_message>
<xml_diff>
--- a/EQ2OgreBot/InstanceController/Instance_Files/Custom/_Exp_20_Ballads_of_Zimara/Helper_Files/Aether_Wroughtlands_Native_Mettle.pptx
+++ b/EQ2OgreBot/InstanceController/Instance_Files/Custom/_Exp_20_Ballads_of_Zimara/Helper_Files/Aether_Wroughtlands_Native_Mettle.pptx
@@ -7,6 +7,8 @@
   <p:sldIdLst>
     <p:sldId id="256" r:id="rId2"/>
     <p:sldId id="257" r:id="rId3"/>
+    <p:sldId id="258" r:id="rId4"/>
+    <p:sldId id="259" r:id="rId5"/>
   </p:sldIdLst>
   <p:sldSz cx="12192000" cy="6858000"/>
   <p:notesSz cx="6858000" cy="9144000"/>
@@ -138,6 +140,146 @@
     </inkml:brush>
   </inkml:definitions>
   <inkml:trace contextRef="#ctx0" brushRef="#br0">7773 0 24575,'0'1332'0,"-1"-1313"0,-1 1 0,-7 29 0,5-29 0,1 0 0,-1 28 0,2-14 0,-11 61 0,11-85 0,-17 126 0,-3-3 0,2-53 0,-13 75 0,28-130 0,0-1 0,-2-1 0,-1 1 0,0-1 0,-2 0 0,-18 31 0,14-28 0,-17 47 0,22-49 0,-1 0 0,-26 43 0,2 1 0,28-53 0,-1-1 0,0 0 0,-13 19 0,13-22 0,1 0 0,0 0 0,0 1 0,1 0 0,-5 21 0,6-20 0,0-1 0,0-1 0,-1 1 0,0-1 0,-1 0 0,-8 12 0,2-5 0,2 0 0,0 0 0,1 1 0,1 0 0,-10 34 0,10-28 0,-1 0 0,-22 42 0,-41 83 0,61-129 0,1 0 0,1 0 0,1 1 0,-9 40 0,10-36 0,0-1 0,-2 0 0,-15 31 0,10-25 0,1 0 0,1 1 0,-9 43 0,13-49 0,-59 152 0,51-102 0,11-50 0,-1 0 0,0-1 0,-15 34 0,15-42 0,0 2 0,1-1 0,1 1 0,-3 31 0,4-25 0,-12 46 0,2-25 0,8-26 0,-1 0 0,-1-1 0,0 1 0,-12 19 0,-14 32 0,-6 8 0,25-54 0,-18 45 0,22-47 0,0 0 0,-24 38 0,6-8 0,24-44 0,0 0 0,-1 0 0,0 0 0,0 0 0,-11 13 0,8-12 0,1 0 0,0 1 0,0 0 0,-5 14 0,-14 22 0,-19 13 0,31-44 0,1 1 0,0 1 0,-12 24 0,19-31 0,-1 0 0,-1 0 0,-10 12 0,-16 23 0,-15 32 0,-75 93 0,1-6 0,101-137 0,-1-1 0,-39 35 0,40-40 0,-55 55 0,33-29 0,14-15 0,-140 161 0,90-109 0,-9 6 0,-1-5 0,54-54 0,-89 101 0,115-123 0,-23 24 0,-1-2 0,-45 34 0,72-60 0,0 0 0,1 0 0,0 1 0,-10 13 0,10-12 0,0 0 0,-1-1 0,1 0 0,-9 7 0,-100 91 0,57-58 0,-56 52 0,-19 12 0,32-31 0,100-79 0,-14 16 0,-2 0 0,0-1 0,-1-1 0,0-1 0,-41 24 0,53-35 0,0 1 0,0 1 0,0-1 0,1 1 0,-1 0 0,-7 9 0,8-8 0,0 0 0,-1 0 0,0-1 0,0 0 0,-13 8 0,-49 33 0,52-34 0,-1 0 0,-24 12 0,33-19 0,1 0 0,-1 0 0,1 1 0,0 0 0,1 0 0,-7 8 0,7-8 0,0 0 0,-1 0 0,1 0 0,-1 0 0,0-1 0,-11 6 0,-7 2 0,0 2 0,1 1 0,-27 24 0,24-19 0,-48 30 0,63-44 0,-42 24 0,-93 38 0,136-64 0,0 1 0,1 0 0,0 1 0,-17 13 0,-16 11 0,4-7 0,8-4 0,-38 17 0,-49 28 0,81-43 0,-53 25 0,34-15 0,45-25 0,1 0 0,-1-1 0,-1 0 0,-12 5 0,-29 9 0,-51 28 0,-4 2 0,43-17 0,49-24 0,0-1 0,-1 0 0,1-1 0,-20 5 0,16-5 0,0 0 0,-30 16 0,-32 12 0,68-32 0,1 1 0,0 1 0,1 0 0,-1 1 0,1 0 0,-19 13 0,22-13 0,-1-1 0,1 0 0,-1 0 0,0-1 0,0 0 0,-21 4 0,22-5 0,-1-1 0,1 1 0,0 0 0,0 1 0,0 0 0,1 0 0,0 1 0,-1 0 0,-6 6 0,6-4 0,1-1 0,-1-1 0,-1 0 0,1 0 0,-1-1 0,0 0 0,1-1 0,-2 0 0,-18 3 0,18-4 0,0 1 0,0 0 0,0 0 0,0 1 0,1 1 0,-1-1 0,1 2 0,-11 6 0,13-7 0,0 0 0,0-1 0,-1 0 0,0 0 0,0-1 0,0 0 0,0-1 0,0 0 0,-14 1 0,-46 14 0,4 8 0,-2-4 0,-90 18 0,130-33 0,0 1 0,1 1 0,0 1 0,0 2 0,-38 20 0,45-22 0,0-1 0,0-1 0,-1-1 0,0-1 0,-23 4 0,-7 1 0,45-9 0,-8 2 0,-1 1 0,1 0 0,-1 1 0,1 0 0,-13 8 0,4-3 0,-1-1 0,0 0 0,-43 8 0,31-8 0,-14 2 0,32-8 0,0 1 0,0 1 0,-23 9 0,6 0 0,-1-3 0,0 0 0,-1-2 0,-73 7 0,94-12-170,1 1-1,0 0 0,0 0 1,0 2-1,1 0 0,0 0 1,-24 18-1,26-17-6655</inkml:trace>
+</inkml:ink>
+</file>
+
+<file path=ppt/ink/ink2.xml><?xml version="1.0" encoding="utf-8"?>
+<inkml:ink xmlns:inkml="http://www.w3.org/2003/InkML">
+  <inkml:definitions>
+    <inkml:context xml:id="ctx0">
+      <inkml:inkSource xml:id="inkSrc0">
+        <inkml:traceFormat>
+          <inkml:channel name="X" type="integer" min="-2.14748E9" max="2.14748E9" units="cm"/>
+          <inkml:channel name="Y" type="integer" min="-2.14748E9" max="2.14748E9" units="cm"/>
+          <inkml:channel name="F" type="integer" max="32767" units="dev"/>
+        </inkml:traceFormat>
+        <inkml:channelProperties>
+          <inkml:channelProperty channel="X" name="resolution" value="1000" units="1/cm"/>
+          <inkml:channelProperty channel="Y" name="resolution" value="1000" units="1/cm"/>
+          <inkml:channelProperty channel="F" name="resolution" value="0" units="1/dev"/>
+        </inkml:channelProperties>
+      </inkml:inkSource>
+      <inkml:timestamp xml:id="ts0" timeString="2024-04-10T19:08:10.682"/>
+    </inkml:context>
+    <inkml:brush xml:id="br0">
+      <inkml:brushProperty name="width" value="0.1" units="cm"/>
+      <inkml:brushProperty name="height" value="0.1" units="cm"/>
+      <inkml:brushProperty name="color" value="#E71224"/>
+    </inkml:brush>
+  </inkml:definitions>
+  <inkml:trace contextRef="#ctx0" brushRef="#br0">3202 1 24575,'-1'0'0,"-33"0"0,-49 6 0,70-4 0,1 1 0,-1 0 0,1 0 0,0 2 0,0-1 0,0 2 0,-13 7 0,1 0 0,-2-1 0,-36 13 0,34-15 0,-53 27 0,46-21 0,0-1 0,-1-1 0,-1-2 0,-51 10 0,-28 10 0,81-23 0,-47 7 0,47-10 0,-51 15 0,68-17 0,1 0 0,-1-1 0,0-1 0,0 0 0,-19-2 0,20 0 0,1 0 0,-1 1 0,1 1 0,0 0 0,-1 1 0,-22 8 0,22-5 0,0-1 0,-1-1 0,1-1 0,-1-1 0,0 0 0,-22-1 0,-13 1 0,19 3 0,1 1 0,-40 13 0,-1-1 0,-145 46 0,180-55 0,1 2 0,0 2 0,-65 30 0,26-12 0,55-23 0,-1 1 0,2 1 0,-26 15 0,32-17 0,-1 0 0,0-1 0,-28 9 0,25-10 0,1 1 0,-30 14 0,-229 134 0,233-128 0,-48 39 0,2-1 0,61-48 0,23-14 0,0 1 0,-1-1 0,1 1 0,1 1 0,-1-1 0,1 1 0,-1 0 0,1 0 0,-5 8 0,-8 12 0,2 0 0,-15 31 0,26-45 0,1 1 0,0 0 0,0 0 0,1 0 0,1 1 0,0-1 0,0 25 0,2-26 0,-2 9 0,2 0 0,0-1 0,1 1 0,2 0 0,-1-1 0,2 0 0,1 1 0,12 33 0,5-1 0,12 24 0,-22-53 0,-1 0 0,11 35 0,-15-36 0,2 0 0,0 0 0,17 28 0,-18-37 0,-1 1 0,-1 1 0,9 25 0,-12-28 0,2 1 0,-1-1 0,2 0 0,0-1 0,0 1 0,11 14 0,0-3 0,27 49 0,-29-45 0,27 36 0,-18-28 0,-20-27 0,0-1 0,1 0 0,0 0 0,0-1 0,1 1 0,0-1 0,0-1 0,10 8 0,23 17 0,-33-24 0,1 0 0,0-1 0,0 0 0,1 0 0,0 0 0,0-1 0,10 4 0,29 10 0,47 25 0,-62-26 0,2-2 0,-1-1 0,65 17 0,-43-19 0,138 23 0,-154-28 0,-1 1 0,0 3 0,0 1 0,-1 1 0,62 33 0,-88-42 0,0 0 0,1 0 0,-1-1 0,1-1 0,20 2 0,-17-3 0,-1 1 0,0 1 0,24 7 0,-29-6 0,19 7 0,0-1 0,1-1 0,31 5 0,34 5 0,-65-12 0,-1-1 0,1-1 0,49 2 0,345-8 0,-411 2 0,-1 0 0,1 1 0,-1 1 0,1 0 0,-1 0 0,0 1 0,0 1 0,14 7 0,-13-6 0,-1 0 0,1-1 0,-1-1 0,1 0 0,1-1 0,-1 0 0,15 1 0,-6-3-1365,-2-1-5461</inkml:trace>
+</inkml:ink>
+</file>
+
+<file path=ppt/ink/ink3.xml><?xml version="1.0" encoding="utf-8"?>
+<inkml:ink xmlns:inkml="http://www.w3.org/2003/InkML">
+  <inkml:definitions>
+    <inkml:context xml:id="ctx0">
+      <inkml:inkSource xml:id="inkSrc0">
+        <inkml:traceFormat>
+          <inkml:channel name="X" type="integer" min="-2.14748E9" max="2.14748E9" units="cm"/>
+          <inkml:channel name="Y" type="integer" min="-2.14748E9" max="2.14748E9" units="cm"/>
+          <inkml:channel name="F" type="integer" max="32767" units="dev"/>
+        </inkml:traceFormat>
+        <inkml:channelProperties>
+          <inkml:channelProperty channel="X" name="resolution" value="1000" units="1/cm"/>
+          <inkml:channelProperty channel="Y" name="resolution" value="1000" units="1/cm"/>
+          <inkml:channelProperty channel="F" name="resolution" value="0" units="1/dev"/>
+        </inkml:channelProperties>
+      </inkml:inkSource>
+      <inkml:timestamp xml:id="ts0" timeString="2024-04-10T19:08:35.433"/>
+    </inkml:context>
+    <inkml:brush xml:id="br0">
+      <inkml:brushProperty name="width" value="0.1" units="cm"/>
+      <inkml:brushProperty name="height" value="0.1" units="cm"/>
+      <inkml:brushProperty name="color" value="#E71224"/>
+    </inkml:brush>
+  </inkml:definitions>
+  <inkml:trace contextRef="#ctx0" brushRef="#br0">1 1 24575,'6'1'0,"0"1"0,-1 0 0,1 0 0,0 0 0,-1 1 0,0 0 0,9 6 0,7 3 0,-13-6 0,1 0 0,-2 1 0,1 0 0,-1 0 0,0 1 0,0 0 0,-1 0 0,0 0 0,6 11 0,7 9 0,13 18 0,-18-25 0,1 1 0,32 31 0,83 67 0,-67-68 0,-40-33 0,0 0 0,36 40 0,-49-48 0,0-1 0,1-1 0,19 14 0,20 17 0,-18-10 0,-18-18 0,0 2 0,17 21 0,102 125 0,-123-144 0,0 0 0,12 28 0,8 13 0,121 155 0,-84-107 0,-55-89 0,-2-4 0,-1 1 0,0 0 0,-1 0 0,10 23 0,-14-27 0,1-1 0,0 0 0,0 0 0,1 0 0,0-1 0,13 12 0,11 15 0,17 36 0,-31-45 0,0 0 0,27 28 0,-36-43 0,1 0 0,-2 1 0,1 0 0,-1 0 0,4 12 0,10 18 0,21 36 0,-23-40 0,2-1 0,42 58 0,-53-81 0,-1 0 0,-1 0 0,10 22 0,5 10 0,-3-15 0,-13-21 0,-1-1 0,0 1 0,-1 0 0,1 0 0,-2 0 0,4 12 0,29 84 0,-7-25 0,29 97 0,-50-150 0,1-1 0,1 0 0,1-1 0,15 26 0,-3-4 0,-18-35 0,1-1 0,-1 0 0,2 0 0,10 15 0,69 98 0,-65-90 0,2 0 0,46 52 0,-1 4 0,-23-30 0,-38-48 0,1 0 0,1-1 0,0 1 0,1-2 0,12 12 0,-1-2-1365</inkml:trace>
+</inkml:ink>
+</file>
+
+<file path=ppt/ink/ink4.xml><?xml version="1.0" encoding="utf-8"?>
+<inkml:ink xmlns:inkml="http://www.w3.org/2003/InkML">
+  <inkml:definitions>
+    <inkml:context xml:id="ctx0">
+      <inkml:inkSource xml:id="inkSrc0">
+        <inkml:traceFormat>
+          <inkml:channel name="X" type="integer" min="-2.14748E9" max="2.14748E9" units="cm"/>
+          <inkml:channel name="Y" type="integer" min="-2.14748E9" max="2.14748E9" units="cm"/>
+          <inkml:channel name="F" type="integer" max="32767" units="dev"/>
+        </inkml:traceFormat>
+        <inkml:channelProperties>
+          <inkml:channelProperty channel="X" name="resolution" value="1000" units="1/cm"/>
+          <inkml:channelProperty channel="Y" name="resolution" value="1000" units="1/cm"/>
+          <inkml:channelProperty channel="F" name="resolution" value="0" units="1/dev"/>
+        </inkml:channelProperties>
+      </inkml:inkSource>
+      <inkml:timestamp xml:id="ts0" timeString="2024-04-10T19:08:56.795"/>
+    </inkml:context>
+    <inkml:brush xml:id="br0">
+      <inkml:brushProperty name="width" value="0.1" units="cm"/>
+      <inkml:brushProperty name="height" value="0.1" units="cm"/>
+      <inkml:brushProperty name="color" value="#E71224"/>
+    </inkml:brush>
+  </inkml:definitions>
+  <inkml:trace contextRef="#ctx0" brushRef="#br0">2196 6465 24575,'24'0'0,"4"-1"0,-1 1 0,0 1 0,0 1 0,0 2 0,-1 0 0,1 2 0,25 9 0,-25-6 0,48 10 0,-15-5 0,-41-6 0,0 0 0,-1 1 0,-1 0 0,0 2 0,0 0 0,20 18 0,29 18 0,-36-26 0,34 30 0,-19-13 0,-18-18 0,1 0 0,1-2 0,36 18 0,-18-9 0,-35-19 0,0-1 0,1 0 0,22 8 0,28 4 0,-31-10 0,48 19 0,-65-22 0,0-2 0,1 0 0,-1-1 0,1 0 0,29 0 0,21 4 0,76 20 0,56 5 0,-100-16 0,-57-11 0,-1 2 0,45 15 0,-17-6 0,-50-12 0,-1 0 0,1 0 0,22 11 0,-27-10 0,1-1 0,0 0 0,1-1 0,26 3 0,13 2 0,105 14 0,-132-17 0,47 1 0,-53-5 0,-1 1 0,1 0 0,-1 2 0,34 9 0,-25-5 0,1-2 0,0-1 0,0-1 0,0-2 0,0-1 0,53-4 0,-1 0 0,-57 1 0,-1-1 0,1-1 0,-1-1 0,0-1 0,27-12 0,49-11 0,-89 27 0,-1-2 0,1 1 0,-1-1 0,0-1 0,0 0 0,0 0 0,-1-1 0,16-11 0,-1-5 0,36-38 0,-30 28 0,71-94 0,-91 115 0,0 0 0,-1-1 0,0-1 0,9-18 0,-10 17 0,1-1 0,21-25 0,-16 22 0,-2 0 0,0 0 0,18-38 0,3-4 0,-28 49 0,0 0 0,0 0 0,-1 0 0,-1 0 0,5-23 0,-7 23 0,1 0 0,1 1 0,0-1 0,0 1 0,1 0 0,1 0 0,8-14 0,-6 9 0,0 1 0,-2-1 0,0 0 0,0 0 0,-1 0 0,-1-1 0,2-20 0,4-43 0,-5 41 0,1 0 0,2 1 0,1-1 0,15-37 0,-14 50 0,-1-1 0,-1 0 0,-1 0 0,4-37 0,14-67 0,-4 32 0,-13 54 0,-1 12 0,-1 0 0,0-41 0,-4 42 0,11-59 0,-2 30 0,-1 1 0,-4 29 0,-1-1 0,0-31 0,-5-801 0,-1 843 0,0 0 0,-2-1 0,0 1 0,-1 0 0,-16-36 0,-8-37 0,21 62 0,3 12 0,1 0 0,1 0 0,-2-27 0,5 25 0,-1 1 0,-1-1 0,-1 1 0,-1 0 0,-1 0 0,-11-31 0,13 45 0,-4-6 0,2-1 0,-1 0 0,1 0 0,1 0 0,-3-16 0,2 1 0,-2 0 0,-1 1 0,-19-45 0,8 31 0,2-1 0,2-1 0,-14-62 0,25 90 0,-1 0 0,0 1 0,-1-1 0,-12-18 0,10 19 0,1 1 0,1-2 0,0 1 0,-5-20 0,6 14 0,-1 0 0,-2 1 0,-10-22 0,-3-5 0,-3-24 0,18 49 0,-1 0 0,-1 0 0,-15-27 0,14 30 0,0 0 0,2-1 0,-7-22 0,-10-27 0,-67-136 0,65 136 0,19 47 0,-1 0 0,-16-31 0,14 32 0,0-1 0,-8-27 0,14 33 0,-1 1 0,-1 0 0,0 0 0,-1 1 0,0 0 0,-1 0 0,-13-17 0,-7-3 0,-23-36 0,42 56 0,0 0 0,-1 1 0,0 0 0,-1 0 0,0 1 0,-1 1 0,-16-12 0,-55-43 0,58 44 0,-1 1 0,-54-32 0,-51-30 0,78 49 0,40 24 0,0 0 0,0 1 0,-26-11 0,-66-30 0,20 7 0,61 32 0,0-1 0,1-1 0,1-1 0,-25-19 0,-82-52 0,109 71 0,-1 1 0,-1 0 0,-37-13 0,13 5 0,-39-20 0,24 10 0,0 3 0,-89-26 0,129 46 0,-1-1 0,-22-12 0,26 11 0,-1 1 0,0 1 0,-22-6 0,22 8 0,0-1 0,-35-17 0,37 15 0,-2 0 0,-33-9 0,-202-48 0,199 45 0,43 14 0,0 1 0,-1 1 0,1 0 0,-1 1 0,-17-3 0,0 1 0,-1-1 0,1-2 0,0-1 0,-51-22 0,46 16 0,-1 2 0,-60-14 0,-19 3 0,86 18 0,-1-1 0,-36-15 0,-36-10 0,44 17 0,-75-30 0,85 28 0,-34-2 0,33 10 0,-22-4 0,48 10 0,-1-1 0,1-2 0,-24-8 0,9 2 0,-1 2 0,-52-7 0,25 5 0,-139-37 0,140 38 0,1 2 0,-79 1 0,89 9 0,15 1 0,0-2 0,0-1 0,-72-13 0,-24-10 0,65 11 0,-104-6 0,169 19 0,-146-23 0,89 13 0,-35-2 0,10 1 114,64 6-607,1 2 0,-26-1 0,29 4-6333</inkml:trace>
+</inkml:ink>
+</file>
+
+<file path=ppt/ink/ink5.xml><?xml version="1.0" encoding="utf-8"?>
+<inkml:ink xmlns:inkml="http://www.w3.org/2003/InkML">
+  <inkml:definitions>
+    <inkml:context xml:id="ctx0">
+      <inkml:inkSource xml:id="inkSrc0">
+        <inkml:traceFormat>
+          <inkml:channel name="X" type="integer" min="-2.14748E9" max="2.14748E9" units="cm"/>
+          <inkml:channel name="Y" type="integer" min="-2.14748E9" max="2.14748E9" units="cm"/>
+          <inkml:channel name="F" type="integer" max="32767" units="dev"/>
+        </inkml:traceFormat>
+        <inkml:channelProperties>
+          <inkml:channelProperty channel="X" name="resolution" value="1000" units="1/cm"/>
+          <inkml:channelProperty channel="Y" name="resolution" value="1000" units="1/cm"/>
+          <inkml:channelProperty channel="F" name="resolution" value="0" units="1/dev"/>
+        </inkml:channelProperties>
+      </inkml:inkSource>
+      <inkml:timestamp xml:id="ts0" timeString="2024-04-10T19:09:04.901"/>
+    </inkml:context>
+    <inkml:brush xml:id="br0">
+      <inkml:brushProperty name="width" value="0.1" units="cm"/>
+      <inkml:brushProperty name="height" value="0.1" units="cm"/>
+      <inkml:brushProperty name="color" value="#E71224"/>
+    </inkml:brush>
+  </inkml:definitions>
+  <inkml:trace contextRef="#ctx0" brushRef="#br0">1 0 24575,'3'0'0,"6"0"0</inkml:trace>
+</inkml:ink>
+</file>
+
+<file path=ppt/ink/ink6.xml><?xml version="1.0" encoding="utf-8"?>
+<inkml:ink xmlns:inkml="http://www.w3.org/2003/InkML">
+  <inkml:definitions>
+    <inkml:context xml:id="ctx0">
+      <inkml:inkSource xml:id="inkSrc0">
+        <inkml:traceFormat>
+          <inkml:channel name="X" type="integer" min="-2.14748E9" max="2.14748E9" units="cm"/>
+          <inkml:channel name="Y" type="integer" min="-2.14748E9" max="2.14748E9" units="cm"/>
+          <inkml:channel name="F" type="integer" max="32767" units="dev"/>
+        </inkml:traceFormat>
+        <inkml:channelProperties>
+          <inkml:channelProperty channel="X" name="resolution" value="1000" units="1/cm"/>
+          <inkml:channelProperty channel="Y" name="resolution" value="1000" units="1/cm"/>
+          <inkml:channelProperty channel="F" name="resolution" value="0" units="1/dev"/>
+        </inkml:channelProperties>
+      </inkml:inkSource>
+      <inkml:timestamp xml:id="ts0" timeString="2024-04-10T19:09:08.338"/>
+    </inkml:context>
+    <inkml:brush xml:id="br0">
+      <inkml:brushProperty name="width" value="0.1" units="cm"/>
+      <inkml:brushProperty name="height" value="0.1" units="cm"/>
+      <inkml:brushProperty name="color" value="#E71224"/>
+    </inkml:brush>
+  </inkml:definitions>
+  <inkml:trace contextRef="#ctx0" brushRef="#br0">1 0 24575,'4'0'0,"5"0"0,1 4 0</inkml:trace>
 </inkml:ink>
 </file>
 
@@ -6404,6 +6546,705 @@
 </p:sld>
 </file>
 
+<file path=ppt/slides/slide3.xml><?xml version="1.0" encoding="utf-8"?>
+<p:sld xmlns:a="http://schemas.openxmlformats.org/drawingml/2006/main" xmlns:r="http://schemas.openxmlformats.org/officeDocument/2006/relationships" xmlns:p="http://schemas.openxmlformats.org/presentationml/2006/main">
+  <p:cSld>
+    <p:spTree>
+      <p:nvGrpSpPr>
+        <p:cNvPr id="1" name=""/>
+        <p:cNvGrpSpPr/>
+        <p:nvPr/>
+      </p:nvGrpSpPr>
+      <p:grpSpPr>
+        <a:xfrm>
+          <a:off x="0" y="0"/>
+          <a:ext cx="0" cy="0"/>
+          <a:chOff x="0" y="0"/>
+          <a:chExt cx="0" cy="0"/>
+        </a:xfrm>
+      </p:grpSpPr>
+      <p:pic>
+        <p:nvPicPr>
+          <p:cNvPr id="5" name="Picture 4">
+            <a:extLst>
+              <a:ext uri="{FF2B5EF4-FFF2-40B4-BE49-F238E27FC236}">
+                <a16:creationId xmlns:a16="http://schemas.microsoft.com/office/drawing/2014/main" id="{610EF399-A746-28C8-49BB-521CAE29CF72}"/>
+              </a:ext>
+            </a:extLst>
+          </p:cNvPr>
+          <p:cNvPicPr>
+            <a:picLocks noChangeAspect="1"/>
+          </p:cNvPicPr>
+          <p:nvPr/>
+        </p:nvPicPr>
+        <p:blipFill>
+          <a:blip r:embed="rId2"/>
+          <a:stretch>
+            <a:fillRect/>
+          </a:stretch>
+        </p:blipFill>
+        <p:spPr>
+          <a:xfrm>
+            <a:off x="1466005" y="0"/>
+            <a:ext cx="8698531" cy="6867262"/>
+          </a:xfrm>
+          <a:prstGeom prst="rect">
+            <a:avLst/>
+          </a:prstGeom>
+        </p:spPr>
+      </p:pic>
+      <mc:AlternateContent xmlns:mc="http://schemas.openxmlformats.org/markup-compatibility/2006">
+        <mc:Choice xmlns:p14="http://schemas.microsoft.com/office/powerpoint/2010/main" Requires="p14">
+          <p:contentPart p14:bwMode="auto" r:id="rId3">
+            <p14:nvContentPartPr>
+              <p14:cNvPr id="8" name="Ink 7">
+                <a:extLst>
+                  <a:ext uri="{FF2B5EF4-FFF2-40B4-BE49-F238E27FC236}">
+                    <a16:creationId xmlns:a16="http://schemas.microsoft.com/office/drawing/2014/main" id="{99B2736B-40F8-844F-F265-6F6D0A786ACC}"/>
+                  </a:ext>
+                </a:extLst>
+              </p14:cNvPr>
+              <p14:cNvContentPartPr/>
+              <p14:nvPr/>
+            </p14:nvContentPartPr>
+            <p14:xfrm>
+              <a:off x="3933669" y="2318207"/>
+              <a:ext cx="1152720" cy="1046160"/>
+            </p14:xfrm>
+          </p:contentPart>
+        </mc:Choice>
+        <mc:Fallback>
+          <p:pic>
+            <p:nvPicPr>
+              <p:cNvPr id="8" name="Ink 7">
+                <a:extLst>
+                  <a:ext uri="{FF2B5EF4-FFF2-40B4-BE49-F238E27FC236}">
+                    <a16:creationId xmlns:a16="http://schemas.microsoft.com/office/drawing/2014/main" id="{99B2736B-40F8-844F-F265-6F6D0A786ACC}"/>
+                  </a:ext>
+                </a:extLst>
+              </p:cNvPr>
+              <p:cNvPicPr/>
+              <p:nvPr/>
+            </p:nvPicPr>
+            <p:blipFill>
+              <a:blip r:embed="rId4"/>
+              <a:stretch>
+                <a:fillRect/>
+              </a:stretch>
+            </p:blipFill>
+            <p:spPr>
+              <a:xfrm>
+                <a:off x="3916029" y="2300567"/>
+                <a:ext cx="1188360" cy="1081800"/>
+              </a:xfrm>
+              <a:prstGeom prst="rect">
+                <a:avLst/>
+              </a:prstGeom>
+            </p:spPr>
+          </p:pic>
+        </mc:Fallback>
+      </mc:AlternateContent>
+      <mc:AlternateContent xmlns:mc="http://schemas.openxmlformats.org/markup-compatibility/2006">
+        <mc:Choice xmlns:p14="http://schemas.microsoft.com/office/powerpoint/2010/main" Requires="p14">
+          <p:contentPart p14:bwMode="auto" r:id="rId5">
+            <p14:nvContentPartPr>
+              <p14:cNvPr id="9" name="Ink 8">
+                <a:extLst>
+                  <a:ext uri="{FF2B5EF4-FFF2-40B4-BE49-F238E27FC236}">
+                    <a16:creationId xmlns:a16="http://schemas.microsoft.com/office/drawing/2014/main" id="{14FC2374-B447-0742-A963-7D4964D5551F}"/>
+                  </a:ext>
+                </a:extLst>
+              </p14:cNvPr>
+              <p14:cNvContentPartPr/>
+              <p14:nvPr/>
+            </p14:nvContentPartPr>
+            <p14:xfrm>
+              <a:off x="4963629" y="3371567"/>
+              <a:ext cx="878400" cy="1252080"/>
+            </p14:xfrm>
+          </p:contentPart>
+        </mc:Choice>
+        <mc:Fallback>
+          <p:pic>
+            <p:nvPicPr>
+              <p:cNvPr id="9" name="Ink 8">
+                <a:extLst>
+                  <a:ext uri="{FF2B5EF4-FFF2-40B4-BE49-F238E27FC236}">
+                    <a16:creationId xmlns:a16="http://schemas.microsoft.com/office/drawing/2014/main" id="{14FC2374-B447-0742-A963-7D4964D5551F}"/>
+                  </a:ext>
+                </a:extLst>
+              </p:cNvPr>
+              <p:cNvPicPr/>
+              <p:nvPr/>
+            </p:nvPicPr>
+            <p:blipFill>
+              <a:blip r:embed="rId6"/>
+              <a:stretch>
+                <a:fillRect/>
+              </a:stretch>
+            </p:blipFill>
+            <p:spPr>
+              <a:xfrm>
+                <a:off x="4945989" y="3353927"/>
+                <a:ext cx="914040" cy="1287720"/>
+              </a:xfrm>
+              <a:prstGeom prst="rect">
+                <a:avLst/>
+              </a:prstGeom>
+            </p:spPr>
+          </p:pic>
+        </mc:Fallback>
+      </mc:AlternateContent>
+      <mc:AlternateContent xmlns:mc="http://schemas.openxmlformats.org/markup-compatibility/2006">
+        <mc:Choice xmlns:p14="http://schemas.microsoft.com/office/powerpoint/2010/main" Requires="p14">
+          <p:contentPart p14:bwMode="auto" r:id="rId7">
+            <p14:nvContentPartPr>
+              <p14:cNvPr id="10" name="Ink 9">
+                <a:extLst>
+                  <a:ext uri="{FF2B5EF4-FFF2-40B4-BE49-F238E27FC236}">
+                    <a16:creationId xmlns:a16="http://schemas.microsoft.com/office/drawing/2014/main" id="{082D8881-DB5E-9875-B282-EFC3D2DD3951}"/>
+                  </a:ext>
+                </a:extLst>
+              </p14:cNvPr>
+              <p14:cNvContentPartPr/>
+              <p14:nvPr/>
+            </p14:nvContentPartPr>
+            <p14:xfrm>
+              <a:off x="5046789" y="2301647"/>
+              <a:ext cx="2293560" cy="2623320"/>
+            </p14:xfrm>
+          </p:contentPart>
+        </mc:Choice>
+        <mc:Fallback>
+          <p:pic>
+            <p:nvPicPr>
+              <p:cNvPr id="10" name="Ink 9">
+                <a:extLst>
+                  <a:ext uri="{FF2B5EF4-FFF2-40B4-BE49-F238E27FC236}">
+                    <a16:creationId xmlns:a16="http://schemas.microsoft.com/office/drawing/2014/main" id="{082D8881-DB5E-9875-B282-EFC3D2DD3951}"/>
+                  </a:ext>
+                </a:extLst>
+              </p:cNvPr>
+              <p:cNvPicPr/>
+              <p:nvPr/>
+            </p:nvPicPr>
+            <p:blipFill>
+              <a:blip r:embed="rId8"/>
+              <a:stretch>
+                <a:fillRect/>
+              </a:stretch>
+            </p:blipFill>
+            <p:spPr>
+              <a:xfrm>
+                <a:off x="5028789" y="2284007"/>
+                <a:ext cx="2329200" cy="2658960"/>
+              </a:xfrm>
+              <a:prstGeom prst="rect">
+                <a:avLst/>
+              </a:prstGeom>
+            </p:spPr>
+          </p:pic>
+        </mc:Fallback>
+      </mc:AlternateContent>
+      <mc:AlternateContent xmlns:mc="http://schemas.openxmlformats.org/markup-compatibility/2006">
+        <mc:Choice xmlns:p14="http://schemas.microsoft.com/office/powerpoint/2010/main" Requires="p14">
+          <p:contentPart p14:bwMode="auto" r:id="rId9">
+            <p14:nvContentPartPr>
+              <p14:cNvPr id="13" name="Ink 12">
+                <a:extLst>
+                  <a:ext uri="{FF2B5EF4-FFF2-40B4-BE49-F238E27FC236}">
+                    <a16:creationId xmlns:a16="http://schemas.microsoft.com/office/drawing/2014/main" id="{506162B0-EF45-A0B0-0E89-E5ED5B131304}"/>
+                  </a:ext>
+                </a:extLst>
+              </p14:cNvPr>
+              <p14:cNvContentPartPr/>
+              <p14:nvPr/>
+            </p14:nvContentPartPr>
+            <p14:xfrm>
+              <a:off x="4914669" y="3363647"/>
+              <a:ext cx="5040" cy="360"/>
+            </p14:xfrm>
+          </p:contentPart>
+        </mc:Choice>
+        <mc:Fallback>
+          <p:pic>
+            <p:nvPicPr>
+              <p:cNvPr id="13" name="Ink 12">
+                <a:extLst>
+                  <a:ext uri="{FF2B5EF4-FFF2-40B4-BE49-F238E27FC236}">
+                    <a16:creationId xmlns:a16="http://schemas.microsoft.com/office/drawing/2014/main" id="{506162B0-EF45-A0B0-0E89-E5ED5B131304}"/>
+                  </a:ext>
+                </a:extLst>
+              </p:cNvPr>
+              <p:cNvPicPr/>
+              <p:nvPr/>
+            </p:nvPicPr>
+            <p:blipFill>
+              <a:blip r:embed="rId10"/>
+              <a:stretch>
+                <a:fillRect/>
+              </a:stretch>
+            </p:blipFill>
+            <p:spPr>
+              <a:xfrm>
+                <a:off x="4897029" y="3345647"/>
+                <a:ext cx="40680" cy="36000"/>
+              </a:xfrm>
+              <a:prstGeom prst="rect">
+                <a:avLst/>
+              </a:prstGeom>
+            </p:spPr>
+          </p:pic>
+        </mc:Fallback>
+      </mc:AlternateContent>
+      <mc:AlternateContent xmlns:mc="http://schemas.openxmlformats.org/markup-compatibility/2006">
+        <mc:Choice xmlns:p14="http://schemas.microsoft.com/office/powerpoint/2010/main" Requires="p14">
+          <p:contentPart p14:bwMode="auto" r:id="rId11">
+            <p14:nvContentPartPr>
+              <p14:cNvPr id="14" name="Ink 13">
+                <a:extLst>
+                  <a:ext uri="{FF2B5EF4-FFF2-40B4-BE49-F238E27FC236}">
+                    <a16:creationId xmlns:a16="http://schemas.microsoft.com/office/drawing/2014/main" id="{4F49D52B-9775-E09B-83A8-8E6ECB7D4FE6}"/>
+                  </a:ext>
+                </a:extLst>
+              </p14:cNvPr>
+              <p14:cNvContentPartPr/>
+              <p14:nvPr/>
+            </p14:nvContentPartPr>
+            <p14:xfrm>
+              <a:off x="4922589" y="3355367"/>
+              <a:ext cx="8640" cy="1800"/>
+            </p14:xfrm>
+          </p:contentPart>
+        </mc:Choice>
+        <mc:Fallback>
+          <p:pic>
+            <p:nvPicPr>
+              <p:cNvPr id="14" name="Ink 13">
+                <a:extLst>
+                  <a:ext uri="{FF2B5EF4-FFF2-40B4-BE49-F238E27FC236}">
+                    <a16:creationId xmlns:a16="http://schemas.microsoft.com/office/drawing/2014/main" id="{4F49D52B-9775-E09B-83A8-8E6ECB7D4FE6}"/>
+                  </a:ext>
+                </a:extLst>
+              </p:cNvPr>
+              <p:cNvPicPr/>
+              <p:nvPr/>
+            </p:nvPicPr>
+            <p:blipFill>
+              <a:blip r:embed="rId12"/>
+              <a:stretch>
+                <a:fillRect/>
+              </a:stretch>
+            </p:blipFill>
+            <p:spPr>
+              <a:xfrm>
+                <a:off x="4904949" y="3337367"/>
+                <a:ext cx="44280" cy="37440"/>
+              </a:xfrm>
+              <a:prstGeom prst="rect">
+                <a:avLst/>
+              </a:prstGeom>
+            </p:spPr>
+          </p:pic>
+        </mc:Fallback>
+      </mc:AlternateContent>
+      <p:sp>
+        <p:nvSpPr>
+          <p:cNvPr id="15" name="Rectangle 14">
+            <a:extLst>
+              <a:ext uri="{FF2B5EF4-FFF2-40B4-BE49-F238E27FC236}">
+                <a16:creationId xmlns:a16="http://schemas.microsoft.com/office/drawing/2014/main" id="{F653ED2E-A2F2-4EAC-A5D8-8B708BE41AF5}"/>
+              </a:ext>
+            </a:extLst>
+          </p:cNvPr>
+          <p:cNvSpPr/>
+          <p:nvPr/>
+        </p:nvSpPr>
+        <p:spPr>
+          <a:xfrm>
+            <a:off x="6008261" y="3703341"/>
+            <a:ext cx="370615" cy="523220"/>
+          </a:xfrm>
+          <a:prstGeom prst="rect">
+            <a:avLst/>
+          </a:prstGeom>
+          <a:noFill/>
+        </p:spPr>
+        <p:txBody>
+          <a:bodyPr wrap="none" lIns="91440" tIns="45720" rIns="91440" bIns="45720">
+            <a:spAutoFit/>
+          </a:bodyPr>
+          <a:lstStyle/>
+          <a:p>
+            <a:pPr algn="ctr"/>
+            <a:r>
+              <a:rPr lang="en-US" sz="2800" b="0" cap="none" spc="0" dirty="0">
+                <a:ln w="0"/>
+                <a:solidFill>
+                  <a:schemeClr val="tx1"/>
+                </a:solidFill>
+                <a:effectLst>
+                  <a:outerShdw blurRad="38100" dist="19050" dir="2700000" algn="tl" rotWithShape="0">
+                    <a:schemeClr val="dk1">
+                      <a:alpha val="40000"/>
+                    </a:schemeClr>
+                  </a:outerShdw>
+                </a:effectLst>
+              </a:rPr>
+              <a:t>X</a:t>
+            </a:r>
+          </a:p>
+        </p:txBody>
+      </p:sp>
+    </p:spTree>
+    <p:extLst>
+      <p:ext uri="{BB962C8B-B14F-4D97-AF65-F5344CB8AC3E}">
+        <p14:creationId xmlns:p14="http://schemas.microsoft.com/office/powerpoint/2010/main" val="3272509230"/>
+      </p:ext>
+    </p:extLst>
+  </p:cSld>
+  <p:clrMapOvr>
+    <a:masterClrMapping/>
+  </p:clrMapOvr>
+</p:sld>
+</file>
+
+<file path=ppt/slides/slide4.xml><?xml version="1.0" encoding="utf-8"?>
+<p:sld xmlns:a="http://schemas.openxmlformats.org/drawingml/2006/main" xmlns:r="http://schemas.openxmlformats.org/officeDocument/2006/relationships" xmlns:p="http://schemas.openxmlformats.org/presentationml/2006/main">
+  <p:cSld>
+    <p:spTree>
+      <p:nvGrpSpPr>
+        <p:cNvPr id="1" name=""/>
+        <p:cNvGrpSpPr/>
+        <p:nvPr/>
+      </p:nvGrpSpPr>
+      <p:grpSpPr>
+        <a:xfrm>
+          <a:off x="0" y="0"/>
+          <a:ext cx="0" cy="0"/>
+          <a:chOff x="0" y="0"/>
+          <a:chExt cx="0" cy="0"/>
+        </a:xfrm>
+      </p:grpSpPr>
+      <p:pic>
+        <p:nvPicPr>
+          <p:cNvPr id="5" name="Picture 4">
+            <a:extLst>
+              <a:ext uri="{FF2B5EF4-FFF2-40B4-BE49-F238E27FC236}">
+                <a16:creationId xmlns:a16="http://schemas.microsoft.com/office/drawing/2014/main" id="{FCE86367-E2C2-E0C0-5BB1-41D2C491A595}"/>
+              </a:ext>
+            </a:extLst>
+          </p:cNvPr>
+          <p:cNvPicPr>
+            <a:picLocks noChangeAspect="1"/>
+          </p:cNvPicPr>
+          <p:nvPr/>
+        </p:nvPicPr>
+        <p:blipFill>
+          <a:blip r:embed="rId2"/>
+          <a:stretch>
+            <a:fillRect/>
+          </a:stretch>
+        </p:blipFill>
+        <p:spPr>
+          <a:xfrm>
+            <a:off x="2594827" y="0"/>
+            <a:ext cx="7599409" cy="6858000"/>
+          </a:xfrm>
+          <a:prstGeom prst="rect">
+            <a:avLst/>
+          </a:prstGeom>
+        </p:spPr>
+      </p:pic>
+      <p:sp>
+        <p:nvSpPr>
+          <p:cNvPr id="7" name="Rectangle 6">
+            <a:extLst>
+              <a:ext uri="{FF2B5EF4-FFF2-40B4-BE49-F238E27FC236}">
+                <a16:creationId xmlns:a16="http://schemas.microsoft.com/office/drawing/2014/main" id="{CC2289AE-A4FC-6B25-2969-204BF1EBE750}"/>
+              </a:ext>
+            </a:extLst>
+          </p:cNvPr>
+          <p:cNvSpPr/>
+          <p:nvPr/>
+        </p:nvSpPr>
+        <p:spPr>
+          <a:xfrm>
+            <a:off x="7738580" y="3429000"/>
+            <a:ext cx="535723" cy="923330"/>
+          </a:xfrm>
+          <a:prstGeom prst="rect">
+            <a:avLst/>
+          </a:prstGeom>
+          <a:noFill/>
+        </p:spPr>
+        <p:txBody>
+          <a:bodyPr wrap="none" lIns="91440" tIns="45720" rIns="91440" bIns="45720">
+            <a:spAutoFit/>
+          </a:bodyPr>
+          <a:lstStyle/>
+          <a:p>
+            <a:pPr algn="ctr"/>
+            <a:r>
+              <a:rPr lang="en-US" sz="5400" b="1" dirty="0">
+                <a:ln w="22225">
+                  <a:solidFill>
+                    <a:schemeClr val="tx1"/>
+                  </a:solidFill>
+                  <a:prstDash val="solid"/>
+                </a:ln>
+                <a:solidFill>
+                  <a:schemeClr val="bg1"/>
+                </a:solidFill>
+              </a:rPr>
+              <a:t>1</a:t>
+            </a:r>
+          </a:p>
+        </p:txBody>
+      </p:sp>
+      <p:sp>
+        <p:nvSpPr>
+          <p:cNvPr id="8" name="Rectangle 7">
+            <a:extLst>
+              <a:ext uri="{FF2B5EF4-FFF2-40B4-BE49-F238E27FC236}">
+                <a16:creationId xmlns:a16="http://schemas.microsoft.com/office/drawing/2014/main" id="{9B451D13-B368-A755-55E5-37223BAE262E}"/>
+              </a:ext>
+            </a:extLst>
+          </p:cNvPr>
+          <p:cNvSpPr/>
+          <p:nvPr/>
+        </p:nvSpPr>
+        <p:spPr>
+          <a:xfrm>
+            <a:off x="7580737" y="2675164"/>
+            <a:ext cx="535723" cy="923330"/>
+          </a:xfrm>
+          <a:prstGeom prst="rect">
+            <a:avLst/>
+          </a:prstGeom>
+          <a:noFill/>
+        </p:spPr>
+        <p:txBody>
+          <a:bodyPr wrap="none" lIns="91440" tIns="45720" rIns="91440" bIns="45720">
+            <a:spAutoFit/>
+          </a:bodyPr>
+          <a:lstStyle/>
+          <a:p>
+            <a:pPr algn="ctr"/>
+            <a:r>
+              <a:rPr lang="en-US" sz="5400" b="1" dirty="0">
+                <a:ln w="22225">
+                  <a:solidFill>
+                    <a:schemeClr val="tx1"/>
+                  </a:solidFill>
+                  <a:prstDash val="solid"/>
+                </a:ln>
+                <a:solidFill>
+                  <a:schemeClr val="bg1"/>
+                </a:solidFill>
+              </a:rPr>
+              <a:t>2</a:t>
+            </a:r>
+          </a:p>
+        </p:txBody>
+      </p:sp>
+      <p:sp>
+        <p:nvSpPr>
+          <p:cNvPr id="9" name="Rectangle 8">
+            <a:extLst>
+              <a:ext uri="{FF2B5EF4-FFF2-40B4-BE49-F238E27FC236}">
+                <a16:creationId xmlns:a16="http://schemas.microsoft.com/office/drawing/2014/main" id="{E05E2ED0-549E-F6A0-0D0C-CC120895756B}"/>
+              </a:ext>
+            </a:extLst>
+          </p:cNvPr>
+          <p:cNvSpPr/>
+          <p:nvPr/>
+        </p:nvSpPr>
+        <p:spPr>
+          <a:xfrm>
+            <a:off x="7045014" y="1654629"/>
+            <a:ext cx="535723" cy="923330"/>
+          </a:xfrm>
+          <a:prstGeom prst="rect">
+            <a:avLst/>
+          </a:prstGeom>
+          <a:noFill/>
+        </p:spPr>
+        <p:txBody>
+          <a:bodyPr wrap="none" lIns="91440" tIns="45720" rIns="91440" bIns="45720">
+            <a:spAutoFit/>
+          </a:bodyPr>
+          <a:lstStyle/>
+          <a:p>
+            <a:pPr algn="ctr"/>
+            <a:r>
+              <a:rPr lang="en-US" sz="5400" b="1" dirty="0">
+                <a:ln w="22225">
+                  <a:solidFill>
+                    <a:schemeClr val="tx1"/>
+                  </a:solidFill>
+                  <a:prstDash val="solid"/>
+                </a:ln>
+                <a:solidFill>
+                  <a:schemeClr val="bg1"/>
+                </a:solidFill>
+              </a:rPr>
+              <a:t>3</a:t>
+            </a:r>
+          </a:p>
+        </p:txBody>
+      </p:sp>
+      <p:sp>
+        <p:nvSpPr>
+          <p:cNvPr id="10" name="Rectangle 9">
+            <a:extLst>
+              <a:ext uri="{FF2B5EF4-FFF2-40B4-BE49-F238E27FC236}">
+                <a16:creationId xmlns:a16="http://schemas.microsoft.com/office/drawing/2014/main" id="{770BDFEB-A197-9501-435E-6CC58FE10EF0}"/>
+              </a:ext>
+            </a:extLst>
+          </p:cNvPr>
+          <p:cNvSpPr/>
+          <p:nvPr/>
+        </p:nvSpPr>
+        <p:spPr>
+          <a:xfrm>
+            <a:off x="5686623" y="1524000"/>
+            <a:ext cx="535723" cy="923330"/>
+          </a:xfrm>
+          <a:prstGeom prst="rect">
+            <a:avLst/>
+          </a:prstGeom>
+          <a:noFill/>
+        </p:spPr>
+        <p:txBody>
+          <a:bodyPr wrap="none" lIns="91440" tIns="45720" rIns="91440" bIns="45720">
+            <a:spAutoFit/>
+          </a:bodyPr>
+          <a:lstStyle/>
+          <a:p>
+            <a:pPr algn="ctr"/>
+            <a:r>
+              <a:rPr lang="en-US" sz="5400" b="1" dirty="0">
+                <a:ln w="22225">
+                  <a:solidFill>
+                    <a:schemeClr val="tx1"/>
+                  </a:solidFill>
+                  <a:prstDash val="solid"/>
+                </a:ln>
+                <a:solidFill>
+                  <a:schemeClr val="bg1"/>
+                </a:solidFill>
+              </a:rPr>
+              <a:t>4</a:t>
+            </a:r>
+          </a:p>
+        </p:txBody>
+      </p:sp>
+      <p:sp>
+        <p:nvSpPr>
+          <p:cNvPr id="11" name="Rectangle 10">
+            <a:extLst>
+              <a:ext uri="{FF2B5EF4-FFF2-40B4-BE49-F238E27FC236}">
+                <a16:creationId xmlns:a16="http://schemas.microsoft.com/office/drawing/2014/main" id="{FAC9E636-134A-6181-AC9B-9FFF70DE9F49}"/>
+              </a:ext>
+            </a:extLst>
+          </p:cNvPr>
+          <p:cNvSpPr/>
+          <p:nvPr/>
+        </p:nvSpPr>
+        <p:spPr>
+          <a:xfrm>
+            <a:off x="4965677" y="2064586"/>
+            <a:ext cx="535723" cy="923330"/>
+          </a:xfrm>
+          <a:prstGeom prst="rect">
+            <a:avLst/>
+          </a:prstGeom>
+          <a:noFill/>
+        </p:spPr>
+        <p:txBody>
+          <a:bodyPr wrap="none" lIns="91440" tIns="45720" rIns="91440" bIns="45720">
+            <a:spAutoFit/>
+          </a:bodyPr>
+          <a:lstStyle/>
+          <a:p>
+            <a:pPr algn="ctr"/>
+            <a:r>
+              <a:rPr lang="en-US" sz="5400" b="1" dirty="0">
+                <a:ln w="22225">
+                  <a:solidFill>
+                    <a:schemeClr val="tx1"/>
+                  </a:solidFill>
+                  <a:prstDash val="solid"/>
+                </a:ln>
+                <a:solidFill>
+                  <a:schemeClr val="bg1"/>
+                </a:solidFill>
+              </a:rPr>
+              <a:t>5</a:t>
+            </a:r>
+          </a:p>
+        </p:txBody>
+      </p:sp>
+      <p:sp>
+        <p:nvSpPr>
+          <p:cNvPr id="12" name="Rectangle 11">
+            <a:extLst>
+              <a:ext uri="{FF2B5EF4-FFF2-40B4-BE49-F238E27FC236}">
+                <a16:creationId xmlns:a16="http://schemas.microsoft.com/office/drawing/2014/main" id="{54C872C5-86EF-CDF2-DF29-111022863176}"/>
+              </a:ext>
+            </a:extLst>
+          </p:cNvPr>
+          <p:cNvSpPr/>
+          <p:nvPr/>
+        </p:nvSpPr>
+        <p:spPr>
+          <a:xfrm>
+            <a:off x="4473137" y="2805793"/>
+            <a:ext cx="535723" cy="923330"/>
+          </a:xfrm>
+          <a:prstGeom prst="rect">
+            <a:avLst/>
+          </a:prstGeom>
+          <a:noFill/>
+        </p:spPr>
+        <p:txBody>
+          <a:bodyPr wrap="none" lIns="91440" tIns="45720" rIns="91440" bIns="45720">
+            <a:spAutoFit/>
+          </a:bodyPr>
+          <a:lstStyle/>
+          <a:p>
+            <a:pPr algn="ctr"/>
+            <a:r>
+              <a:rPr lang="en-US" sz="5400" b="1" dirty="0">
+                <a:ln w="22225">
+                  <a:solidFill>
+                    <a:schemeClr val="tx1"/>
+                  </a:solidFill>
+                  <a:prstDash val="solid"/>
+                </a:ln>
+                <a:solidFill>
+                  <a:schemeClr val="bg1"/>
+                </a:solidFill>
+              </a:rPr>
+              <a:t>6</a:t>
+            </a:r>
+          </a:p>
+        </p:txBody>
+      </p:sp>
+    </p:spTree>
+    <p:extLst>
+      <p:ext uri="{BB962C8B-B14F-4D97-AF65-F5344CB8AC3E}">
+        <p14:creationId xmlns:p14="http://schemas.microsoft.com/office/powerpoint/2010/main" val="552219264"/>
+      </p:ext>
+    </p:extLst>
+  </p:cSld>
+  <p:clrMapOvr>
+    <a:masterClrMapping/>
+  </p:clrMapOvr>
+</p:sld>
+</file>
+
 <file path=ppt/theme/theme1.xml><?xml version="1.0" encoding="utf-8"?>
 <a:theme xmlns:a="http://schemas.openxmlformats.org/drawingml/2006/main" name="Office Theme">
   <a:themeElements>

</xml_diff>